<commit_message>
added tbm 930 pptx
</commit_message>
<xml_diff>
--- a/Makin Buttons.pptx
+++ b/Makin Buttons.pptx
@@ -105,6 +105,24 @@
     <p:sldId id="354" r:id="rId99"/>
     <p:sldId id="356" r:id="rId100"/>
     <p:sldId id="357" r:id="rId101"/>
+    <p:sldId id="358" r:id="rId102"/>
+    <p:sldId id="359" r:id="rId103"/>
+    <p:sldId id="360" r:id="rId104"/>
+    <p:sldId id="361" r:id="rId105"/>
+    <p:sldId id="362" r:id="rId106"/>
+    <p:sldId id="363" r:id="rId107"/>
+    <p:sldId id="364" r:id="rId108"/>
+    <p:sldId id="365" r:id="rId109"/>
+    <p:sldId id="366" r:id="rId110"/>
+    <p:sldId id="367" r:id="rId111"/>
+    <p:sldId id="368" r:id="rId112"/>
+    <p:sldId id="369" r:id="rId113"/>
+    <p:sldId id="370" r:id="rId114"/>
+    <p:sldId id="371" r:id="rId115"/>
+    <p:sldId id="372" r:id="rId116"/>
+    <p:sldId id="373" r:id="rId117"/>
+    <p:sldId id="374" r:id="rId118"/>
+    <p:sldId id="375" r:id="rId119"/>
   </p:sldIdLst>
   <p:sldSz cx="6840538" cy="6840538"/>
   <p:notesSz cx="6858000" cy="9144000"/>
@@ -342,7 +360,7 @@
           <a:p>
             <a:fld id="{CBDF84DA-6A89-47F4-AFD8-4D319A66B6F4}" type="datetimeFigureOut">
               <a:rPr lang="en-NZ" smtClean="0"/>
-              <a:t>26/06/2023</a:t>
+              <a:t>29/06/2023</a:t>
             </a:fld>
             <a:endParaRPr lang="en-NZ"/>
           </a:p>
@@ -512,7 +530,7 @@
           <a:p>
             <a:fld id="{CBDF84DA-6A89-47F4-AFD8-4D319A66B6F4}" type="datetimeFigureOut">
               <a:rPr lang="en-NZ" smtClean="0"/>
-              <a:t>26/06/2023</a:t>
+              <a:t>29/06/2023</a:t>
             </a:fld>
             <a:endParaRPr lang="en-NZ"/>
           </a:p>
@@ -692,7 +710,7 @@
           <a:p>
             <a:fld id="{CBDF84DA-6A89-47F4-AFD8-4D319A66B6F4}" type="datetimeFigureOut">
               <a:rPr lang="en-NZ" smtClean="0"/>
-              <a:t>26/06/2023</a:t>
+              <a:t>29/06/2023</a:t>
             </a:fld>
             <a:endParaRPr lang="en-NZ"/>
           </a:p>
@@ -862,7 +880,7 @@
           <a:p>
             <a:fld id="{CBDF84DA-6A89-47F4-AFD8-4D319A66B6F4}" type="datetimeFigureOut">
               <a:rPr lang="en-NZ" smtClean="0"/>
-              <a:t>26/06/2023</a:t>
+              <a:t>29/06/2023</a:t>
             </a:fld>
             <a:endParaRPr lang="en-NZ"/>
           </a:p>
@@ -1106,7 +1124,7 @@
           <a:p>
             <a:fld id="{CBDF84DA-6A89-47F4-AFD8-4D319A66B6F4}" type="datetimeFigureOut">
               <a:rPr lang="en-NZ" smtClean="0"/>
-              <a:t>26/06/2023</a:t>
+              <a:t>29/06/2023</a:t>
             </a:fld>
             <a:endParaRPr lang="en-NZ"/>
           </a:p>
@@ -1338,7 +1356,7 @@
           <a:p>
             <a:fld id="{CBDF84DA-6A89-47F4-AFD8-4D319A66B6F4}" type="datetimeFigureOut">
               <a:rPr lang="en-NZ" smtClean="0"/>
-              <a:t>26/06/2023</a:t>
+              <a:t>29/06/2023</a:t>
             </a:fld>
             <a:endParaRPr lang="en-NZ"/>
           </a:p>
@@ -1705,7 +1723,7 @@
           <a:p>
             <a:fld id="{CBDF84DA-6A89-47F4-AFD8-4D319A66B6F4}" type="datetimeFigureOut">
               <a:rPr lang="en-NZ" smtClean="0"/>
-              <a:t>26/06/2023</a:t>
+              <a:t>29/06/2023</a:t>
             </a:fld>
             <a:endParaRPr lang="en-NZ"/>
           </a:p>
@@ -1823,7 +1841,7 @@
           <a:p>
             <a:fld id="{CBDF84DA-6A89-47F4-AFD8-4D319A66B6F4}" type="datetimeFigureOut">
               <a:rPr lang="en-NZ" smtClean="0"/>
-              <a:t>26/06/2023</a:t>
+              <a:t>29/06/2023</a:t>
             </a:fld>
             <a:endParaRPr lang="en-NZ"/>
           </a:p>
@@ -1918,7 +1936,7 @@
           <a:p>
             <a:fld id="{CBDF84DA-6A89-47F4-AFD8-4D319A66B6F4}" type="datetimeFigureOut">
               <a:rPr lang="en-NZ" smtClean="0"/>
-              <a:t>26/06/2023</a:t>
+              <a:t>29/06/2023</a:t>
             </a:fld>
             <a:endParaRPr lang="en-NZ"/>
           </a:p>
@@ -2195,7 +2213,7 @@
           <a:p>
             <a:fld id="{CBDF84DA-6A89-47F4-AFD8-4D319A66B6F4}" type="datetimeFigureOut">
               <a:rPr lang="en-NZ" smtClean="0"/>
-              <a:t>26/06/2023</a:t>
+              <a:t>29/06/2023</a:t>
             </a:fld>
             <a:endParaRPr lang="en-NZ"/>
           </a:p>
@@ -2452,7 +2470,7 @@
           <a:p>
             <a:fld id="{CBDF84DA-6A89-47F4-AFD8-4D319A66B6F4}" type="datetimeFigureOut">
               <a:rPr lang="en-NZ" smtClean="0"/>
-              <a:t>26/06/2023</a:t>
+              <a:t>29/06/2023</a:t>
             </a:fld>
             <a:endParaRPr lang="en-NZ"/>
           </a:p>
@@ -2671,7 +2689,7 @@
           <a:p>
             <a:fld id="{CBDF84DA-6A89-47F4-AFD8-4D319A66B6F4}" type="datetimeFigureOut">
               <a:rPr lang="en-NZ" smtClean="0"/>
-              <a:t>26/06/2023</a:t>
+              <a:t>29/06/2023</a:t>
             </a:fld>
             <a:endParaRPr lang="en-NZ"/>
           </a:p>
@@ -3635,6 +3653,1582 @@
 </p:sld>
 </file>
 
+<file path=ppt/slides/slide101.xml><?xml version="1.0" encoding="utf-8"?>
+<p:sld xmlns:a="http://schemas.openxmlformats.org/drawingml/2006/main" xmlns:r="http://schemas.openxmlformats.org/officeDocument/2006/relationships" xmlns:p="http://schemas.openxmlformats.org/presentationml/2006/main">
+  <p:cSld>
+    <p:spTree>
+      <p:nvGrpSpPr>
+        <p:cNvPr id="1" name=""/>
+        <p:cNvGrpSpPr/>
+        <p:nvPr/>
+      </p:nvGrpSpPr>
+      <p:grpSpPr>
+        <a:xfrm>
+          <a:off x="0" y="0"/>
+          <a:ext cx="0" cy="0"/>
+          <a:chOff x="0" y="0"/>
+          <a:chExt cx="0" cy="0"/>
+        </a:xfrm>
+      </p:grpSpPr>
+      <p:sp>
+        <p:nvSpPr>
+          <p:cNvPr id="2" name="Rectangle: Rounded Corners 1">
+            <a:extLst>
+              <a:ext uri="{FF2B5EF4-FFF2-40B4-BE49-F238E27FC236}">
+                <a16:creationId xmlns:a16="http://schemas.microsoft.com/office/drawing/2014/main" id="{294B49A4-842D-103D-2DA7-9CC86CE780A8}"/>
+              </a:ext>
+            </a:extLst>
+          </p:cNvPr>
+          <p:cNvSpPr/>
+          <p:nvPr/>
+        </p:nvSpPr>
+        <p:spPr>
+          <a:xfrm>
+            <a:off x="850323" y="1601094"/>
+            <a:ext cx="5139891" cy="3638350"/>
+          </a:xfrm>
+          <a:prstGeom prst="roundRect">
+            <a:avLst/>
+          </a:prstGeom>
+          <a:solidFill>
+            <a:schemeClr val="tx1">
+              <a:lumMod val="95000"/>
+              <a:lumOff val="5000"/>
+            </a:schemeClr>
+          </a:solidFill>
+          <a:ln>
+            <a:noFill/>
+          </a:ln>
+          <a:scene3d>
+            <a:camera prst="orthographicFront"/>
+            <a:lightRig rig="threePt" dir="t"/>
+          </a:scene3d>
+          <a:sp3d>
+            <a:bevelT w="254000" h="254000"/>
+          </a:sp3d>
+        </p:spPr>
+        <p:style>
+          <a:lnRef idx="2">
+            <a:schemeClr val="accent1">
+              <a:shade val="50000"/>
+            </a:schemeClr>
+          </a:lnRef>
+          <a:fillRef idx="1">
+            <a:schemeClr val="accent1"/>
+          </a:fillRef>
+          <a:effectRef idx="0">
+            <a:schemeClr val="accent1"/>
+          </a:effectRef>
+          <a:fontRef idx="minor">
+            <a:schemeClr val="lt1"/>
+          </a:fontRef>
+        </p:style>
+        <p:txBody>
+          <a:bodyPr rtlCol="0" anchor="ctr"/>
+          <a:lstStyle/>
+          <a:p>
+            <a:pPr algn="ctr"/>
+            <a:endParaRPr lang="en-NZ"/>
+          </a:p>
+        </p:txBody>
+      </p:sp>
+      <p:sp>
+        <p:nvSpPr>
+          <p:cNvPr id="4" name="Rectangle 3">
+            <a:extLst>
+              <a:ext uri="{FF2B5EF4-FFF2-40B4-BE49-F238E27FC236}">
+                <a16:creationId xmlns:a16="http://schemas.microsoft.com/office/drawing/2014/main" id="{E3957FE8-D953-07CD-6753-A8AFE21D59E2}"/>
+              </a:ext>
+            </a:extLst>
+          </p:cNvPr>
+          <p:cNvSpPr/>
+          <p:nvPr/>
+        </p:nvSpPr>
+        <p:spPr>
+          <a:xfrm>
+            <a:off x="1317218" y="2981357"/>
+            <a:ext cx="4215384" cy="877824"/>
+          </a:xfrm>
+          <a:prstGeom prst="rect">
+            <a:avLst/>
+          </a:prstGeom>
+          <a:solidFill>
+            <a:schemeClr val="bg1"/>
+          </a:solidFill>
+          <a:ln>
+            <a:noFill/>
+          </a:ln>
+        </p:spPr>
+        <p:style>
+          <a:lnRef idx="2">
+            <a:schemeClr val="accent1">
+              <a:shade val="50000"/>
+            </a:schemeClr>
+          </a:lnRef>
+          <a:fillRef idx="1">
+            <a:schemeClr val="accent1"/>
+          </a:fillRef>
+          <a:effectRef idx="0">
+            <a:schemeClr val="accent1"/>
+          </a:effectRef>
+          <a:fontRef idx="minor">
+            <a:schemeClr val="lt1"/>
+          </a:fontRef>
+        </p:style>
+        <p:txBody>
+          <a:bodyPr rtlCol="0" anchor="ctr"/>
+          <a:lstStyle/>
+          <a:p>
+            <a:pPr algn="ctr"/>
+            <a:endParaRPr lang="en-NZ"/>
+          </a:p>
+        </p:txBody>
+      </p:sp>
+    </p:spTree>
+    <p:extLst>
+      <p:ext uri="{BB962C8B-B14F-4D97-AF65-F5344CB8AC3E}">
+        <p14:creationId xmlns:p14="http://schemas.microsoft.com/office/powerpoint/2010/main" val="2847128072"/>
+      </p:ext>
+    </p:extLst>
+  </p:cSld>
+  <p:clrMapOvr>
+    <a:masterClrMapping/>
+  </p:clrMapOvr>
+</p:sld>
+</file>
+
+<file path=ppt/slides/slide102.xml><?xml version="1.0" encoding="utf-8"?>
+<p:sld xmlns:a="http://schemas.openxmlformats.org/drawingml/2006/main" xmlns:r="http://schemas.openxmlformats.org/officeDocument/2006/relationships" xmlns:p="http://schemas.openxmlformats.org/presentationml/2006/main">
+  <p:cSld>
+    <p:spTree>
+      <p:nvGrpSpPr>
+        <p:cNvPr id="1" name=""/>
+        <p:cNvGrpSpPr/>
+        <p:nvPr/>
+      </p:nvGrpSpPr>
+      <p:grpSpPr>
+        <a:xfrm>
+          <a:off x="0" y="0"/>
+          <a:ext cx="0" cy="0"/>
+          <a:chOff x="0" y="0"/>
+          <a:chExt cx="0" cy="0"/>
+        </a:xfrm>
+      </p:grpSpPr>
+      <p:sp>
+        <p:nvSpPr>
+          <p:cNvPr id="2" name="Rectangle: Rounded Corners 1">
+            <a:extLst>
+              <a:ext uri="{FF2B5EF4-FFF2-40B4-BE49-F238E27FC236}">
+                <a16:creationId xmlns:a16="http://schemas.microsoft.com/office/drawing/2014/main" id="{294B49A4-842D-103D-2DA7-9CC86CE780A8}"/>
+              </a:ext>
+            </a:extLst>
+          </p:cNvPr>
+          <p:cNvSpPr/>
+          <p:nvPr/>
+        </p:nvSpPr>
+        <p:spPr>
+          <a:xfrm>
+            <a:off x="850323" y="1601094"/>
+            <a:ext cx="5139891" cy="3638350"/>
+          </a:xfrm>
+          <a:prstGeom prst="roundRect">
+            <a:avLst/>
+          </a:prstGeom>
+          <a:solidFill>
+            <a:schemeClr val="tx1">
+              <a:lumMod val="95000"/>
+              <a:lumOff val="5000"/>
+            </a:schemeClr>
+          </a:solidFill>
+          <a:ln>
+            <a:noFill/>
+          </a:ln>
+          <a:scene3d>
+            <a:camera prst="orthographicFront"/>
+            <a:lightRig rig="threePt" dir="t"/>
+          </a:scene3d>
+          <a:sp3d>
+            <a:bevelT w="254000" h="254000"/>
+          </a:sp3d>
+        </p:spPr>
+        <p:style>
+          <a:lnRef idx="2">
+            <a:schemeClr val="accent1">
+              <a:shade val="50000"/>
+            </a:schemeClr>
+          </a:lnRef>
+          <a:fillRef idx="1">
+            <a:schemeClr val="accent1"/>
+          </a:fillRef>
+          <a:effectRef idx="0">
+            <a:schemeClr val="accent1"/>
+          </a:effectRef>
+          <a:fontRef idx="minor">
+            <a:schemeClr val="lt1"/>
+          </a:fontRef>
+        </p:style>
+        <p:txBody>
+          <a:bodyPr rtlCol="0" anchor="ctr"/>
+          <a:lstStyle/>
+          <a:p>
+            <a:pPr algn="ctr"/>
+            <a:endParaRPr lang="en-NZ"/>
+          </a:p>
+        </p:txBody>
+      </p:sp>
+      <p:sp>
+        <p:nvSpPr>
+          <p:cNvPr id="4" name="Rectangle 3">
+            <a:extLst>
+              <a:ext uri="{FF2B5EF4-FFF2-40B4-BE49-F238E27FC236}">
+                <a16:creationId xmlns:a16="http://schemas.microsoft.com/office/drawing/2014/main" id="{E3957FE8-D953-07CD-6753-A8AFE21D59E2}"/>
+              </a:ext>
+            </a:extLst>
+          </p:cNvPr>
+          <p:cNvSpPr/>
+          <p:nvPr/>
+        </p:nvSpPr>
+        <p:spPr>
+          <a:xfrm rot="5400000">
+            <a:off x="2010493" y="2981357"/>
+            <a:ext cx="2819549" cy="877824"/>
+          </a:xfrm>
+          <a:prstGeom prst="rect">
+            <a:avLst/>
+          </a:prstGeom>
+          <a:solidFill>
+            <a:schemeClr val="bg1"/>
+          </a:solidFill>
+          <a:ln>
+            <a:noFill/>
+          </a:ln>
+        </p:spPr>
+        <p:style>
+          <a:lnRef idx="2">
+            <a:schemeClr val="accent1">
+              <a:shade val="50000"/>
+            </a:schemeClr>
+          </a:lnRef>
+          <a:fillRef idx="1">
+            <a:schemeClr val="accent1"/>
+          </a:fillRef>
+          <a:effectRef idx="0">
+            <a:schemeClr val="accent1"/>
+          </a:effectRef>
+          <a:fontRef idx="minor">
+            <a:schemeClr val="lt1"/>
+          </a:fontRef>
+        </p:style>
+        <p:txBody>
+          <a:bodyPr rtlCol="0" anchor="ctr"/>
+          <a:lstStyle/>
+          <a:p>
+            <a:pPr algn="ctr"/>
+            <a:endParaRPr lang="en-NZ"/>
+          </a:p>
+        </p:txBody>
+      </p:sp>
+    </p:spTree>
+    <p:extLst>
+      <p:ext uri="{BB962C8B-B14F-4D97-AF65-F5344CB8AC3E}">
+        <p14:creationId xmlns:p14="http://schemas.microsoft.com/office/powerpoint/2010/main" val="1578034915"/>
+      </p:ext>
+    </p:extLst>
+  </p:cSld>
+  <p:clrMapOvr>
+    <a:masterClrMapping/>
+  </p:clrMapOvr>
+</p:sld>
+</file>
+
+<file path=ppt/slides/slide103.xml><?xml version="1.0" encoding="utf-8"?>
+<p:sld xmlns:a="http://schemas.openxmlformats.org/drawingml/2006/main" xmlns:r="http://schemas.openxmlformats.org/officeDocument/2006/relationships" xmlns:p="http://schemas.openxmlformats.org/presentationml/2006/main">
+  <p:cSld>
+    <p:spTree>
+      <p:nvGrpSpPr>
+        <p:cNvPr id="1" name=""/>
+        <p:cNvGrpSpPr/>
+        <p:nvPr/>
+      </p:nvGrpSpPr>
+      <p:grpSpPr>
+        <a:xfrm>
+          <a:off x="0" y="0"/>
+          <a:ext cx="0" cy="0"/>
+          <a:chOff x="0" y="0"/>
+          <a:chExt cx="0" cy="0"/>
+        </a:xfrm>
+      </p:grpSpPr>
+      <p:sp>
+        <p:nvSpPr>
+          <p:cNvPr id="2" name="Rectangle: Rounded Corners 1">
+            <a:extLst>
+              <a:ext uri="{FF2B5EF4-FFF2-40B4-BE49-F238E27FC236}">
+                <a16:creationId xmlns:a16="http://schemas.microsoft.com/office/drawing/2014/main" id="{294B49A4-842D-103D-2DA7-9CC86CE780A8}"/>
+              </a:ext>
+            </a:extLst>
+          </p:cNvPr>
+          <p:cNvSpPr/>
+          <p:nvPr/>
+        </p:nvSpPr>
+        <p:spPr>
+          <a:xfrm>
+            <a:off x="850323" y="1601094"/>
+            <a:ext cx="5139891" cy="3638350"/>
+          </a:xfrm>
+          <a:prstGeom prst="roundRect">
+            <a:avLst/>
+          </a:prstGeom>
+          <a:solidFill>
+            <a:schemeClr val="tx1">
+              <a:lumMod val="95000"/>
+              <a:lumOff val="5000"/>
+            </a:schemeClr>
+          </a:solidFill>
+          <a:ln>
+            <a:noFill/>
+          </a:ln>
+          <a:scene3d>
+            <a:camera prst="orthographicFront"/>
+            <a:lightRig rig="threePt" dir="t"/>
+          </a:scene3d>
+          <a:sp3d>
+            <a:bevelT w="254000" h="254000"/>
+          </a:sp3d>
+        </p:spPr>
+        <p:style>
+          <a:lnRef idx="2">
+            <a:schemeClr val="accent1">
+              <a:shade val="50000"/>
+            </a:schemeClr>
+          </a:lnRef>
+          <a:fillRef idx="1">
+            <a:schemeClr val="accent1"/>
+          </a:fillRef>
+          <a:effectRef idx="0">
+            <a:schemeClr val="accent1"/>
+          </a:effectRef>
+          <a:fontRef idx="minor">
+            <a:schemeClr val="lt1"/>
+          </a:fontRef>
+        </p:style>
+        <p:txBody>
+          <a:bodyPr rtlCol="0" anchor="ctr"/>
+          <a:lstStyle/>
+          <a:p>
+            <a:pPr algn="ctr"/>
+            <a:endParaRPr lang="en-NZ"/>
+          </a:p>
+        </p:txBody>
+      </p:sp>
+      <p:sp>
+        <p:nvSpPr>
+          <p:cNvPr id="3" name="Isosceles Triangle 2">
+            <a:extLst>
+              <a:ext uri="{FF2B5EF4-FFF2-40B4-BE49-F238E27FC236}">
+                <a16:creationId xmlns:a16="http://schemas.microsoft.com/office/drawing/2014/main" id="{F0BDE340-361C-19BA-5F97-4C8183385D83}"/>
+              </a:ext>
+            </a:extLst>
+          </p:cNvPr>
+          <p:cNvSpPr/>
+          <p:nvPr/>
+        </p:nvSpPr>
+        <p:spPr>
+          <a:xfrm>
+            <a:off x="2194972" y="2290985"/>
+            <a:ext cx="2450592" cy="2258568"/>
+          </a:xfrm>
+          <a:prstGeom prst="triangle">
+            <a:avLst/>
+          </a:prstGeom>
+          <a:solidFill>
+            <a:schemeClr val="bg1"/>
+          </a:solidFill>
+          <a:ln>
+            <a:noFill/>
+          </a:ln>
+        </p:spPr>
+        <p:style>
+          <a:lnRef idx="2">
+            <a:schemeClr val="accent1">
+              <a:shade val="50000"/>
+            </a:schemeClr>
+          </a:lnRef>
+          <a:fillRef idx="1">
+            <a:schemeClr val="accent1"/>
+          </a:fillRef>
+          <a:effectRef idx="0">
+            <a:schemeClr val="accent1"/>
+          </a:effectRef>
+          <a:fontRef idx="minor">
+            <a:schemeClr val="lt1"/>
+          </a:fontRef>
+        </p:style>
+        <p:txBody>
+          <a:bodyPr rtlCol="0" anchor="ctr"/>
+          <a:lstStyle/>
+          <a:p>
+            <a:pPr algn="ctr"/>
+            <a:endParaRPr lang="en-NZ"/>
+          </a:p>
+        </p:txBody>
+      </p:sp>
+    </p:spTree>
+    <p:extLst>
+      <p:ext uri="{BB962C8B-B14F-4D97-AF65-F5344CB8AC3E}">
+        <p14:creationId xmlns:p14="http://schemas.microsoft.com/office/powerpoint/2010/main" val="11521498"/>
+      </p:ext>
+    </p:extLst>
+  </p:cSld>
+  <p:clrMapOvr>
+    <a:masterClrMapping/>
+  </p:clrMapOvr>
+</p:sld>
+</file>
+
+<file path=ppt/slides/slide104.xml><?xml version="1.0" encoding="utf-8"?>
+<p:sld xmlns:a="http://schemas.openxmlformats.org/drawingml/2006/main" xmlns:r="http://schemas.openxmlformats.org/officeDocument/2006/relationships" xmlns:p="http://schemas.openxmlformats.org/presentationml/2006/main">
+  <p:cSld>
+    <p:spTree>
+      <p:nvGrpSpPr>
+        <p:cNvPr id="1" name=""/>
+        <p:cNvGrpSpPr/>
+        <p:nvPr/>
+      </p:nvGrpSpPr>
+      <p:grpSpPr>
+        <a:xfrm>
+          <a:off x="0" y="0"/>
+          <a:ext cx="0" cy="0"/>
+          <a:chOff x="0" y="0"/>
+          <a:chExt cx="0" cy="0"/>
+        </a:xfrm>
+      </p:grpSpPr>
+      <p:sp>
+        <p:nvSpPr>
+          <p:cNvPr id="2" name="Rectangle: Rounded Corners 1">
+            <a:extLst>
+              <a:ext uri="{FF2B5EF4-FFF2-40B4-BE49-F238E27FC236}">
+                <a16:creationId xmlns:a16="http://schemas.microsoft.com/office/drawing/2014/main" id="{294B49A4-842D-103D-2DA7-9CC86CE780A8}"/>
+              </a:ext>
+            </a:extLst>
+          </p:cNvPr>
+          <p:cNvSpPr/>
+          <p:nvPr/>
+        </p:nvSpPr>
+        <p:spPr>
+          <a:xfrm>
+            <a:off x="850323" y="1601094"/>
+            <a:ext cx="5139891" cy="3638350"/>
+          </a:xfrm>
+          <a:prstGeom prst="roundRect">
+            <a:avLst/>
+          </a:prstGeom>
+          <a:solidFill>
+            <a:schemeClr val="tx1">
+              <a:lumMod val="95000"/>
+              <a:lumOff val="5000"/>
+            </a:schemeClr>
+          </a:solidFill>
+          <a:ln>
+            <a:noFill/>
+          </a:ln>
+          <a:scene3d>
+            <a:camera prst="orthographicFront"/>
+            <a:lightRig rig="threePt" dir="t"/>
+          </a:scene3d>
+          <a:sp3d>
+            <a:bevelT w="254000" h="254000"/>
+          </a:sp3d>
+        </p:spPr>
+        <p:style>
+          <a:lnRef idx="2">
+            <a:schemeClr val="accent1">
+              <a:shade val="50000"/>
+            </a:schemeClr>
+          </a:lnRef>
+          <a:fillRef idx="1">
+            <a:schemeClr val="accent1"/>
+          </a:fillRef>
+          <a:effectRef idx="0">
+            <a:schemeClr val="accent1"/>
+          </a:effectRef>
+          <a:fontRef idx="minor">
+            <a:schemeClr val="lt1"/>
+          </a:fontRef>
+        </p:style>
+        <p:txBody>
+          <a:bodyPr rtlCol="0" anchor="ctr"/>
+          <a:lstStyle/>
+          <a:p>
+            <a:pPr algn="ctr"/>
+            <a:endParaRPr lang="en-NZ"/>
+          </a:p>
+        </p:txBody>
+      </p:sp>
+      <p:sp>
+        <p:nvSpPr>
+          <p:cNvPr id="3" name="Isosceles Triangle 2">
+            <a:extLst>
+              <a:ext uri="{FF2B5EF4-FFF2-40B4-BE49-F238E27FC236}">
+                <a16:creationId xmlns:a16="http://schemas.microsoft.com/office/drawing/2014/main" id="{F0BDE340-361C-19BA-5F97-4C8183385D83}"/>
+              </a:ext>
+            </a:extLst>
+          </p:cNvPr>
+          <p:cNvSpPr/>
+          <p:nvPr/>
+        </p:nvSpPr>
+        <p:spPr>
+          <a:xfrm rot="5400000">
+            <a:off x="2469292" y="2290985"/>
+            <a:ext cx="2450592" cy="2258568"/>
+          </a:xfrm>
+          <a:prstGeom prst="triangle">
+            <a:avLst/>
+          </a:prstGeom>
+          <a:solidFill>
+            <a:schemeClr val="bg1"/>
+          </a:solidFill>
+          <a:ln>
+            <a:noFill/>
+          </a:ln>
+        </p:spPr>
+        <p:style>
+          <a:lnRef idx="2">
+            <a:schemeClr val="accent1">
+              <a:shade val="50000"/>
+            </a:schemeClr>
+          </a:lnRef>
+          <a:fillRef idx="1">
+            <a:schemeClr val="accent1"/>
+          </a:fillRef>
+          <a:effectRef idx="0">
+            <a:schemeClr val="accent1"/>
+          </a:effectRef>
+          <a:fontRef idx="minor">
+            <a:schemeClr val="lt1"/>
+          </a:fontRef>
+        </p:style>
+        <p:txBody>
+          <a:bodyPr rtlCol="0" anchor="ctr"/>
+          <a:lstStyle/>
+          <a:p>
+            <a:pPr algn="ctr"/>
+            <a:endParaRPr lang="en-NZ"/>
+          </a:p>
+        </p:txBody>
+      </p:sp>
+    </p:spTree>
+    <p:extLst>
+      <p:ext uri="{BB962C8B-B14F-4D97-AF65-F5344CB8AC3E}">
+        <p14:creationId xmlns:p14="http://schemas.microsoft.com/office/powerpoint/2010/main" val="2554149620"/>
+      </p:ext>
+    </p:extLst>
+  </p:cSld>
+  <p:clrMapOvr>
+    <a:masterClrMapping/>
+  </p:clrMapOvr>
+</p:sld>
+</file>
+
+<file path=ppt/slides/slide105.xml><?xml version="1.0" encoding="utf-8"?>
+<p:sld xmlns:a="http://schemas.openxmlformats.org/drawingml/2006/main" xmlns:r="http://schemas.openxmlformats.org/officeDocument/2006/relationships" xmlns:p="http://schemas.openxmlformats.org/presentationml/2006/main">
+  <p:cSld>
+    <p:spTree>
+      <p:nvGrpSpPr>
+        <p:cNvPr id="1" name=""/>
+        <p:cNvGrpSpPr/>
+        <p:nvPr/>
+      </p:nvGrpSpPr>
+      <p:grpSpPr>
+        <a:xfrm>
+          <a:off x="0" y="0"/>
+          <a:ext cx="0" cy="0"/>
+          <a:chOff x="0" y="0"/>
+          <a:chExt cx="0" cy="0"/>
+        </a:xfrm>
+      </p:grpSpPr>
+      <p:sp>
+        <p:nvSpPr>
+          <p:cNvPr id="6" name="Oval 5">
+            <a:extLst>
+              <a:ext uri="{FF2B5EF4-FFF2-40B4-BE49-F238E27FC236}">
+                <a16:creationId xmlns:a16="http://schemas.microsoft.com/office/drawing/2014/main" id="{13DA4EAA-6768-65DA-BD9B-781763A785E3}"/>
+              </a:ext>
+            </a:extLst>
+          </p:cNvPr>
+          <p:cNvSpPr/>
+          <p:nvPr/>
+        </p:nvSpPr>
+        <p:spPr>
+          <a:xfrm>
+            <a:off x="2080484" y="2092233"/>
+            <a:ext cx="2679570" cy="2656072"/>
+          </a:xfrm>
+          <a:prstGeom prst="ellipse">
+            <a:avLst/>
+          </a:prstGeom>
+          <a:solidFill>
+            <a:schemeClr val="tx1"/>
+          </a:solidFill>
+          <a:ln>
+            <a:solidFill>
+              <a:schemeClr val="tx1"/>
+            </a:solidFill>
+          </a:ln>
+        </p:spPr>
+        <p:style>
+          <a:lnRef idx="2">
+            <a:schemeClr val="accent1">
+              <a:shade val="50000"/>
+            </a:schemeClr>
+          </a:lnRef>
+          <a:fillRef idx="1">
+            <a:schemeClr val="accent1"/>
+          </a:fillRef>
+          <a:effectRef idx="0">
+            <a:schemeClr val="accent1"/>
+          </a:effectRef>
+          <a:fontRef idx="minor">
+            <a:schemeClr val="lt1"/>
+          </a:fontRef>
+        </p:style>
+        <p:txBody>
+          <a:bodyPr rtlCol="0" anchor="ctr"/>
+          <a:lstStyle/>
+          <a:p>
+            <a:pPr algn="ctr"/>
+            <a:endParaRPr lang="en-NZ"/>
+          </a:p>
+        </p:txBody>
+      </p:sp>
+      <p:sp>
+        <p:nvSpPr>
+          <p:cNvPr id="10" name="TextBox 9">
+            <a:extLst>
+              <a:ext uri="{FF2B5EF4-FFF2-40B4-BE49-F238E27FC236}">
+                <a16:creationId xmlns:a16="http://schemas.microsoft.com/office/drawing/2014/main" id="{27BE155E-8F85-643E-6B6E-2F1B446FA796}"/>
+              </a:ext>
+            </a:extLst>
+          </p:cNvPr>
+          <p:cNvSpPr txBox="1"/>
+          <p:nvPr/>
+        </p:nvSpPr>
+        <p:spPr>
+          <a:xfrm>
+            <a:off x="1182420" y="728005"/>
+            <a:ext cx="4475712" cy="1015663"/>
+          </a:xfrm>
+          <a:prstGeom prst="rect">
+            <a:avLst/>
+          </a:prstGeom>
+          <a:noFill/>
+        </p:spPr>
+        <p:txBody>
+          <a:bodyPr wrap="none" rtlCol="0">
+            <a:spAutoFit/>
+          </a:bodyPr>
+          <a:lstStyle/>
+          <a:p>
+            <a:pPr algn="ctr"/>
+            <a:r>
+              <a:rPr lang="en-NZ" sz="6000" dirty="0">
+                <a:solidFill>
+                  <a:schemeClr val="bg1"/>
+                </a:solidFill>
+              </a:rPr>
+              <a:t>ALERNATOR 1</a:t>
+            </a:r>
+          </a:p>
+        </p:txBody>
+      </p:sp>
+      <p:sp>
+        <p:nvSpPr>
+          <p:cNvPr id="12" name="TextBox 11">
+            <a:extLst>
+              <a:ext uri="{FF2B5EF4-FFF2-40B4-BE49-F238E27FC236}">
+                <a16:creationId xmlns:a16="http://schemas.microsoft.com/office/drawing/2014/main" id="{A48FA4B8-CA34-6531-B4CE-9A1F031D198D}"/>
+              </a:ext>
+            </a:extLst>
+          </p:cNvPr>
+          <p:cNvSpPr txBox="1"/>
+          <p:nvPr/>
+        </p:nvSpPr>
+        <p:spPr>
+          <a:xfrm>
+            <a:off x="2718793" y="5096870"/>
+            <a:ext cx="1402949" cy="1015663"/>
+          </a:xfrm>
+          <a:prstGeom prst="rect">
+            <a:avLst/>
+          </a:prstGeom>
+          <a:noFill/>
+        </p:spPr>
+        <p:txBody>
+          <a:bodyPr wrap="none" rtlCol="0">
+            <a:spAutoFit/>
+          </a:bodyPr>
+          <a:lstStyle/>
+          <a:p>
+            <a:pPr algn="ctr"/>
+            <a:r>
+              <a:rPr lang="en-NZ" sz="6000" dirty="0">
+                <a:solidFill>
+                  <a:schemeClr val="bg1"/>
+                </a:solidFill>
+              </a:rPr>
+              <a:t>OFF</a:t>
+            </a:r>
+          </a:p>
+        </p:txBody>
+      </p:sp>
+      <p:pic>
+        <p:nvPicPr>
+          <p:cNvPr id="5" name="Picture 4" descr="A picture containing still life photography, knob, light&#10;&#10;Description automatically generated">
+            <a:extLst>
+              <a:ext uri="{FF2B5EF4-FFF2-40B4-BE49-F238E27FC236}">
+                <a16:creationId xmlns:a16="http://schemas.microsoft.com/office/drawing/2014/main" id="{786007CA-863C-C697-2CF4-B1C06B14B355}"/>
+              </a:ext>
+            </a:extLst>
+          </p:cNvPr>
+          <p:cNvPicPr>
+            <a:picLocks noChangeAspect="1"/>
+          </p:cNvPicPr>
+          <p:nvPr/>
+        </p:nvPicPr>
+        <p:blipFill>
+          <a:blip r:embed="rId2">
+            <a:extLst>
+              <a:ext uri="{28A0092B-C50C-407E-A947-70E740481C1C}">
+                <a14:useLocalDpi xmlns:a14="http://schemas.microsoft.com/office/drawing/2010/main" val="0"/>
+              </a:ext>
+            </a:extLst>
+          </a:blip>
+          <a:stretch>
+            <a:fillRect/>
+          </a:stretch>
+        </p:blipFill>
+        <p:spPr>
+          <a:xfrm>
+            <a:off x="2080484" y="2092233"/>
+            <a:ext cx="2679570" cy="4368865"/>
+          </a:xfrm>
+          <a:prstGeom prst="rect">
+            <a:avLst/>
+          </a:prstGeom>
+        </p:spPr>
+      </p:pic>
+    </p:spTree>
+    <p:extLst>
+      <p:ext uri="{BB962C8B-B14F-4D97-AF65-F5344CB8AC3E}">
+        <p14:creationId xmlns:p14="http://schemas.microsoft.com/office/powerpoint/2010/main" val="2023103196"/>
+      </p:ext>
+    </p:extLst>
+  </p:cSld>
+  <p:clrMapOvr>
+    <a:masterClrMapping/>
+  </p:clrMapOvr>
+</p:sld>
+</file>
+
+<file path=ppt/slides/slide106.xml><?xml version="1.0" encoding="utf-8"?>
+<p:sld xmlns:a="http://schemas.openxmlformats.org/drawingml/2006/main" xmlns:r="http://schemas.openxmlformats.org/officeDocument/2006/relationships" xmlns:p="http://schemas.openxmlformats.org/presentationml/2006/main">
+  <p:cSld>
+    <p:spTree>
+      <p:nvGrpSpPr>
+        <p:cNvPr id="1" name=""/>
+        <p:cNvGrpSpPr/>
+        <p:nvPr/>
+      </p:nvGrpSpPr>
+      <p:grpSpPr>
+        <a:xfrm>
+          <a:off x="0" y="0"/>
+          <a:ext cx="0" cy="0"/>
+          <a:chOff x="0" y="0"/>
+          <a:chExt cx="0" cy="0"/>
+        </a:xfrm>
+      </p:grpSpPr>
+      <p:sp>
+        <p:nvSpPr>
+          <p:cNvPr id="6" name="Oval 5">
+            <a:extLst>
+              <a:ext uri="{FF2B5EF4-FFF2-40B4-BE49-F238E27FC236}">
+                <a16:creationId xmlns:a16="http://schemas.microsoft.com/office/drawing/2014/main" id="{13DA4EAA-6768-65DA-BD9B-781763A785E3}"/>
+              </a:ext>
+            </a:extLst>
+          </p:cNvPr>
+          <p:cNvSpPr/>
+          <p:nvPr/>
+        </p:nvSpPr>
+        <p:spPr>
+          <a:xfrm>
+            <a:off x="2080484" y="2092233"/>
+            <a:ext cx="2679570" cy="2656072"/>
+          </a:xfrm>
+          <a:prstGeom prst="ellipse">
+            <a:avLst/>
+          </a:prstGeom>
+          <a:solidFill>
+            <a:schemeClr val="tx1"/>
+          </a:solidFill>
+          <a:ln>
+            <a:solidFill>
+              <a:schemeClr val="tx1"/>
+            </a:solidFill>
+          </a:ln>
+        </p:spPr>
+        <p:style>
+          <a:lnRef idx="2">
+            <a:schemeClr val="accent1">
+              <a:shade val="50000"/>
+            </a:schemeClr>
+          </a:lnRef>
+          <a:fillRef idx="1">
+            <a:schemeClr val="accent1"/>
+          </a:fillRef>
+          <a:effectRef idx="0">
+            <a:schemeClr val="accent1"/>
+          </a:effectRef>
+          <a:fontRef idx="minor">
+            <a:schemeClr val="lt1"/>
+          </a:fontRef>
+        </p:style>
+        <p:txBody>
+          <a:bodyPr rtlCol="0" anchor="ctr"/>
+          <a:lstStyle/>
+          <a:p>
+            <a:pPr algn="ctr"/>
+            <a:endParaRPr lang="en-NZ"/>
+          </a:p>
+        </p:txBody>
+      </p:sp>
+      <p:sp>
+        <p:nvSpPr>
+          <p:cNvPr id="4" name="TextBox 3">
+            <a:extLst>
+              <a:ext uri="{FF2B5EF4-FFF2-40B4-BE49-F238E27FC236}">
+                <a16:creationId xmlns:a16="http://schemas.microsoft.com/office/drawing/2014/main" id="{120E1379-0638-3F09-2917-946BABB4CDA7}"/>
+              </a:ext>
+            </a:extLst>
+          </p:cNvPr>
+          <p:cNvSpPr txBox="1"/>
+          <p:nvPr/>
+        </p:nvSpPr>
+        <p:spPr>
+          <a:xfrm>
+            <a:off x="2718793" y="5096870"/>
+            <a:ext cx="1402949" cy="1015663"/>
+          </a:xfrm>
+          <a:prstGeom prst="rect">
+            <a:avLst/>
+          </a:prstGeom>
+          <a:noFill/>
+        </p:spPr>
+        <p:txBody>
+          <a:bodyPr wrap="none" rtlCol="0">
+            <a:spAutoFit/>
+          </a:bodyPr>
+          <a:lstStyle/>
+          <a:p>
+            <a:pPr algn="ctr"/>
+            <a:r>
+              <a:rPr lang="en-NZ" sz="6000" dirty="0">
+                <a:solidFill>
+                  <a:schemeClr val="bg1"/>
+                </a:solidFill>
+              </a:rPr>
+              <a:t>OFF</a:t>
+            </a:r>
+          </a:p>
+        </p:txBody>
+      </p:sp>
+      <p:sp>
+        <p:nvSpPr>
+          <p:cNvPr id="7" name="TextBox 6">
+            <a:extLst>
+              <a:ext uri="{FF2B5EF4-FFF2-40B4-BE49-F238E27FC236}">
+                <a16:creationId xmlns:a16="http://schemas.microsoft.com/office/drawing/2014/main" id="{F00287A5-C6ED-068D-998E-A0CC691D3635}"/>
+              </a:ext>
+            </a:extLst>
+          </p:cNvPr>
+          <p:cNvSpPr txBox="1"/>
+          <p:nvPr/>
+        </p:nvSpPr>
+        <p:spPr>
+          <a:xfrm>
+            <a:off x="1023051" y="728005"/>
+            <a:ext cx="4794454" cy="1015663"/>
+          </a:xfrm>
+          <a:prstGeom prst="rect">
+            <a:avLst/>
+          </a:prstGeom>
+          <a:noFill/>
+        </p:spPr>
+        <p:txBody>
+          <a:bodyPr wrap="none" rtlCol="0">
+            <a:spAutoFit/>
+          </a:bodyPr>
+          <a:lstStyle/>
+          <a:p>
+            <a:pPr algn="ctr"/>
+            <a:r>
+              <a:rPr lang="en-NZ" sz="6000" dirty="0">
+                <a:solidFill>
+                  <a:schemeClr val="bg1"/>
+                </a:solidFill>
+              </a:rPr>
+              <a:t>ALTERNATOR 1</a:t>
+            </a:r>
+          </a:p>
+        </p:txBody>
+      </p:sp>
+      <p:pic>
+        <p:nvPicPr>
+          <p:cNvPr id="5" name="Picture 4" descr="A picture containing still life photography, knob, light&#10;&#10;Description automatically generated">
+            <a:extLst>
+              <a:ext uri="{FF2B5EF4-FFF2-40B4-BE49-F238E27FC236}">
+                <a16:creationId xmlns:a16="http://schemas.microsoft.com/office/drawing/2014/main" id="{786007CA-863C-C697-2CF4-B1C06B14B355}"/>
+              </a:ext>
+            </a:extLst>
+          </p:cNvPr>
+          <p:cNvPicPr>
+            <a:picLocks noChangeAspect="1"/>
+          </p:cNvPicPr>
+          <p:nvPr/>
+        </p:nvPicPr>
+        <p:blipFill>
+          <a:blip r:embed="rId2">
+            <a:extLst>
+              <a:ext uri="{28A0092B-C50C-407E-A947-70E740481C1C}">
+                <a14:useLocalDpi xmlns:a14="http://schemas.microsoft.com/office/drawing/2010/main" val="0"/>
+              </a:ext>
+            </a:extLst>
+          </a:blip>
+          <a:stretch>
+            <a:fillRect/>
+          </a:stretch>
+        </p:blipFill>
+        <p:spPr>
+          <a:xfrm rot="10800000">
+            <a:off x="2099734" y="417940"/>
+            <a:ext cx="2679570" cy="4368865"/>
+          </a:xfrm>
+          <a:prstGeom prst="rect">
+            <a:avLst/>
+          </a:prstGeom>
+        </p:spPr>
+      </p:pic>
+    </p:spTree>
+    <p:extLst>
+      <p:ext uri="{BB962C8B-B14F-4D97-AF65-F5344CB8AC3E}">
+        <p14:creationId xmlns:p14="http://schemas.microsoft.com/office/powerpoint/2010/main" val="2042742618"/>
+      </p:ext>
+    </p:extLst>
+  </p:cSld>
+  <p:clrMapOvr>
+    <a:masterClrMapping/>
+  </p:clrMapOvr>
+</p:sld>
+</file>
+
+<file path=ppt/slides/slide107.xml><?xml version="1.0" encoding="utf-8"?>
+<p:sld xmlns:a="http://schemas.openxmlformats.org/drawingml/2006/main" xmlns:r="http://schemas.openxmlformats.org/officeDocument/2006/relationships" xmlns:p="http://schemas.openxmlformats.org/presentationml/2006/main">
+  <p:cSld>
+    <p:spTree>
+      <p:nvGrpSpPr>
+        <p:cNvPr id="1" name=""/>
+        <p:cNvGrpSpPr/>
+        <p:nvPr/>
+      </p:nvGrpSpPr>
+      <p:grpSpPr>
+        <a:xfrm>
+          <a:off x="0" y="0"/>
+          <a:ext cx="0" cy="0"/>
+          <a:chOff x="0" y="0"/>
+          <a:chExt cx="0" cy="0"/>
+        </a:xfrm>
+      </p:grpSpPr>
+      <p:sp>
+        <p:nvSpPr>
+          <p:cNvPr id="6" name="Oval 5">
+            <a:extLst>
+              <a:ext uri="{FF2B5EF4-FFF2-40B4-BE49-F238E27FC236}">
+                <a16:creationId xmlns:a16="http://schemas.microsoft.com/office/drawing/2014/main" id="{13DA4EAA-6768-65DA-BD9B-781763A785E3}"/>
+              </a:ext>
+            </a:extLst>
+          </p:cNvPr>
+          <p:cNvSpPr/>
+          <p:nvPr/>
+        </p:nvSpPr>
+        <p:spPr>
+          <a:xfrm>
+            <a:off x="2080484" y="2092233"/>
+            <a:ext cx="2679570" cy="2656072"/>
+          </a:xfrm>
+          <a:prstGeom prst="ellipse">
+            <a:avLst/>
+          </a:prstGeom>
+          <a:solidFill>
+            <a:schemeClr val="tx1"/>
+          </a:solidFill>
+          <a:ln>
+            <a:solidFill>
+              <a:schemeClr val="tx1"/>
+            </a:solidFill>
+          </a:ln>
+        </p:spPr>
+        <p:style>
+          <a:lnRef idx="2">
+            <a:schemeClr val="accent1">
+              <a:shade val="50000"/>
+            </a:schemeClr>
+          </a:lnRef>
+          <a:fillRef idx="1">
+            <a:schemeClr val="accent1"/>
+          </a:fillRef>
+          <a:effectRef idx="0">
+            <a:schemeClr val="accent1"/>
+          </a:effectRef>
+          <a:fontRef idx="minor">
+            <a:schemeClr val="lt1"/>
+          </a:fontRef>
+        </p:style>
+        <p:txBody>
+          <a:bodyPr rtlCol="0" anchor="ctr"/>
+          <a:lstStyle/>
+          <a:p>
+            <a:pPr algn="ctr"/>
+            <a:endParaRPr lang="en-NZ"/>
+          </a:p>
+        </p:txBody>
+      </p:sp>
+      <p:sp>
+        <p:nvSpPr>
+          <p:cNvPr id="10" name="TextBox 9">
+            <a:extLst>
+              <a:ext uri="{FF2B5EF4-FFF2-40B4-BE49-F238E27FC236}">
+                <a16:creationId xmlns:a16="http://schemas.microsoft.com/office/drawing/2014/main" id="{27BE155E-8F85-643E-6B6E-2F1B446FA796}"/>
+              </a:ext>
+            </a:extLst>
+          </p:cNvPr>
+          <p:cNvSpPr txBox="1"/>
+          <p:nvPr/>
+        </p:nvSpPr>
+        <p:spPr>
+          <a:xfrm>
+            <a:off x="1182420" y="728005"/>
+            <a:ext cx="4475712" cy="1015663"/>
+          </a:xfrm>
+          <a:prstGeom prst="rect">
+            <a:avLst/>
+          </a:prstGeom>
+          <a:noFill/>
+        </p:spPr>
+        <p:txBody>
+          <a:bodyPr wrap="none" rtlCol="0">
+            <a:spAutoFit/>
+          </a:bodyPr>
+          <a:lstStyle/>
+          <a:p>
+            <a:pPr algn="ctr"/>
+            <a:r>
+              <a:rPr lang="en-NZ" sz="6000" dirty="0">
+                <a:solidFill>
+                  <a:schemeClr val="bg1"/>
+                </a:solidFill>
+              </a:rPr>
+              <a:t>ALERNATOR 2</a:t>
+            </a:r>
+          </a:p>
+        </p:txBody>
+      </p:sp>
+      <p:sp>
+        <p:nvSpPr>
+          <p:cNvPr id="12" name="TextBox 11">
+            <a:extLst>
+              <a:ext uri="{FF2B5EF4-FFF2-40B4-BE49-F238E27FC236}">
+                <a16:creationId xmlns:a16="http://schemas.microsoft.com/office/drawing/2014/main" id="{A48FA4B8-CA34-6531-B4CE-9A1F031D198D}"/>
+              </a:ext>
+            </a:extLst>
+          </p:cNvPr>
+          <p:cNvSpPr txBox="1"/>
+          <p:nvPr/>
+        </p:nvSpPr>
+        <p:spPr>
+          <a:xfrm>
+            <a:off x="2718793" y="5096870"/>
+            <a:ext cx="1402949" cy="1015663"/>
+          </a:xfrm>
+          <a:prstGeom prst="rect">
+            <a:avLst/>
+          </a:prstGeom>
+          <a:noFill/>
+        </p:spPr>
+        <p:txBody>
+          <a:bodyPr wrap="none" rtlCol="0">
+            <a:spAutoFit/>
+          </a:bodyPr>
+          <a:lstStyle/>
+          <a:p>
+            <a:pPr algn="ctr"/>
+            <a:r>
+              <a:rPr lang="en-NZ" sz="6000" dirty="0">
+                <a:solidFill>
+                  <a:schemeClr val="bg1"/>
+                </a:solidFill>
+              </a:rPr>
+              <a:t>OFF</a:t>
+            </a:r>
+          </a:p>
+        </p:txBody>
+      </p:sp>
+      <p:pic>
+        <p:nvPicPr>
+          <p:cNvPr id="5" name="Picture 4" descr="A picture containing still life photography, knob, light&#10;&#10;Description automatically generated">
+            <a:extLst>
+              <a:ext uri="{FF2B5EF4-FFF2-40B4-BE49-F238E27FC236}">
+                <a16:creationId xmlns:a16="http://schemas.microsoft.com/office/drawing/2014/main" id="{786007CA-863C-C697-2CF4-B1C06B14B355}"/>
+              </a:ext>
+            </a:extLst>
+          </p:cNvPr>
+          <p:cNvPicPr>
+            <a:picLocks noChangeAspect="1"/>
+          </p:cNvPicPr>
+          <p:nvPr/>
+        </p:nvPicPr>
+        <p:blipFill>
+          <a:blip r:embed="rId2">
+            <a:extLst>
+              <a:ext uri="{28A0092B-C50C-407E-A947-70E740481C1C}">
+                <a14:useLocalDpi xmlns:a14="http://schemas.microsoft.com/office/drawing/2010/main" val="0"/>
+              </a:ext>
+            </a:extLst>
+          </a:blip>
+          <a:stretch>
+            <a:fillRect/>
+          </a:stretch>
+        </p:blipFill>
+        <p:spPr>
+          <a:xfrm>
+            <a:off x="2080484" y="2092233"/>
+            <a:ext cx="2679570" cy="4368865"/>
+          </a:xfrm>
+          <a:prstGeom prst="rect">
+            <a:avLst/>
+          </a:prstGeom>
+        </p:spPr>
+      </p:pic>
+    </p:spTree>
+    <p:extLst>
+      <p:ext uri="{BB962C8B-B14F-4D97-AF65-F5344CB8AC3E}">
+        <p14:creationId xmlns:p14="http://schemas.microsoft.com/office/powerpoint/2010/main" val="817349403"/>
+      </p:ext>
+    </p:extLst>
+  </p:cSld>
+  <p:clrMapOvr>
+    <a:masterClrMapping/>
+  </p:clrMapOvr>
+</p:sld>
+</file>
+
+<file path=ppt/slides/slide108.xml><?xml version="1.0" encoding="utf-8"?>
+<p:sld xmlns:a="http://schemas.openxmlformats.org/drawingml/2006/main" xmlns:r="http://schemas.openxmlformats.org/officeDocument/2006/relationships" xmlns:p="http://schemas.openxmlformats.org/presentationml/2006/main">
+  <p:cSld>
+    <p:spTree>
+      <p:nvGrpSpPr>
+        <p:cNvPr id="1" name=""/>
+        <p:cNvGrpSpPr/>
+        <p:nvPr/>
+      </p:nvGrpSpPr>
+      <p:grpSpPr>
+        <a:xfrm>
+          <a:off x="0" y="0"/>
+          <a:ext cx="0" cy="0"/>
+          <a:chOff x="0" y="0"/>
+          <a:chExt cx="0" cy="0"/>
+        </a:xfrm>
+      </p:grpSpPr>
+      <p:sp>
+        <p:nvSpPr>
+          <p:cNvPr id="6" name="Oval 5">
+            <a:extLst>
+              <a:ext uri="{FF2B5EF4-FFF2-40B4-BE49-F238E27FC236}">
+                <a16:creationId xmlns:a16="http://schemas.microsoft.com/office/drawing/2014/main" id="{13DA4EAA-6768-65DA-BD9B-781763A785E3}"/>
+              </a:ext>
+            </a:extLst>
+          </p:cNvPr>
+          <p:cNvSpPr/>
+          <p:nvPr/>
+        </p:nvSpPr>
+        <p:spPr>
+          <a:xfrm>
+            <a:off x="2080484" y="2092233"/>
+            <a:ext cx="2679570" cy="2656072"/>
+          </a:xfrm>
+          <a:prstGeom prst="ellipse">
+            <a:avLst/>
+          </a:prstGeom>
+          <a:solidFill>
+            <a:schemeClr val="tx1"/>
+          </a:solidFill>
+          <a:ln>
+            <a:solidFill>
+              <a:schemeClr val="tx1"/>
+            </a:solidFill>
+          </a:ln>
+        </p:spPr>
+        <p:style>
+          <a:lnRef idx="2">
+            <a:schemeClr val="accent1">
+              <a:shade val="50000"/>
+            </a:schemeClr>
+          </a:lnRef>
+          <a:fillRef idx="1">
+            <a:schemeClr val="accent1"/>
+          </a:fillRef>
+          <a:effectRef idx="0">
+            <a:schemeClr val="accent1"/>
+          </a:effectRef>
+          <a:fontRef idx="minor">
+            <a:schemeClr val="lt1"/>
+          </a:fontRef>
+        </p:style>
+        <p:txBody>
+          <a:bodyPr rtlCol="0" anchor="ctr"/>
+          <a:lstStyle/>
+          <a:p>
+            <a:pPr algn="ctr"/>
+            <a:endParaRPr lang="en-NZ"/>
+          </a:p>
+        </p:txBody>
+      </p:sp>
+      <p:sp>
+        <p:nvSpPr>
+          <p:cNvPr id="4" name="TextBox 3">
+            <a:extLst>
+              <a:ext uri="{FF2B5EF4-FFF2-40B4-BE49-F238E27FC236}">
+                <a16:creationId xmlns:a16="http://schemas.microsoft.com/office/drawing/2014/main" id="{120E1379-0638-3F09-2917-946BABB4CDA7}"/>
+              </a:ext>
+            </a:extLst>
+          </p:cNvPr>
+          <p:cNvSpPr txBox="1"/>
+          <p:nvPr/>
+        </p:nvSpPr>
+        <p:spPr>
+          <a:xfrm>
+            <a:off x="2718793" y="5096870"/>
+            <a:ext cx="1402949" cy="1015663"/>
+          </a:xfrm>
+          <a:prstGeom prst="rect">
+            <a:avLst/>
+          </a:prstGeom>
+          <a:noFill/>
+        </p:spPr>
+        <p:txBody>
+          <a:bodyPr wrap="none" rtlCol="0">
+            <a:spAutoFit/>
+          </a:bodyPr>
+          <a:lstStyle/>
+          <a:p>
+            <a:pPr algn="ctr"/>
+            <a:r>
+              <a:rPr lang="en-NZ" sz="6000" dirty="0">
+                <a:solidFill>
+                  <a:schemeClr val="bg1"/>
+                </a:solidFill>
+              </a:rPr>
+              <a:t>OFF</a:t>
+            </a:r>
+          </a:p>
+        </p:txBody>
+      </p:sp>
+      <p:sp>
+        <p:nvSpPr>
+          <p:cNvPr id="7" name="TextBox 6">
+            <a:extLst>
+              <a:ext uri="{FF2B5EF4-FFF2-40B4-BE49-F238E27FC236}">
+                <a16:creationId xmlns:a16="http://schemas.microsoft.com/office/drawing/2014/main" id="{F00287A5-C6ED-068D-998E-A0CC691D3635}"/>
+              </a:ext>
+            </a:extLst>
+          </p:cNvPr>
+          <p:cNvSpPr txBox="1"/>
+          <p:nvPr/>
+        </p:nvSpPr>
+        <p:spPr>
+          <a:xfrm>
+            <a:off x="1023051" y="728005"/>
+            <a:ext cx="4794454" cy="1015663"/>
+          </a:xfrm>
+          <a:prstGeom prst="rect">
+            <a:avLst/>
+          </a:prstGeom>
+          <a:noFill/>
+        </p:spPr>
+        <p:txBody>
+          <a:bodyPr wrap="none" rtlCol="0">
+            <a:spAutoFit/>
+          </a:bodyPr>
+          <a:lstStyle/>
+          <a:p>
+            <a:pPr algn="ctr"/>
+            <a:r>
+              <a:rPr lang="en-NZ" sz="6000" dirty="0">
+                <a:solidFill>
+                  <a:schemeClr val="bg1"/>
+                </a:solidFill>
+              </a:rPr>
+              <a:t>ALTERNATOR 2</a:t>
+            </a:r>
+          </a:p>
+        </p:txBody>
+      </p:sp>
+      <p:pic>
+        <p:nvPicPr>
+          <p:cNvPr id="5" name="Picture 4" descr="A picture containing still life photography, knob, light&#10;&#10;Description automatically generated">
+            <a:extLst>
+              <a:ext uri="{FF2B5EF4-FFF2-40B4-BE49-F238E27FC236}">
+                <a16:creationId xmlns:a16="http://schemas.microsoft.com/office/drawing/2014/main" id="{786007CA-863C-C697-2CF4-B1C06B14B355}"/>
+              </a:ext>
+            </a:extLst>
+          </p:cNvPr>
+          <p:cNvPicPr>
+            <a:picLocks noChangeAspect="1"/>
+          </p:cNvPicPr>
+          <p:nvPr/>
+        </p:nvPicPr>
+        <p:blipFill>
+          <a:blip r:embed="rId2">
+            <a:extLst>
+              <a:ext uri="{28A0092B-C50C-407E-A947-70E740481C1C}">
+                <a14:useLocalDpi xmlns:a14="http://schemas.microsoft.com/office/drawing/2010/main" val="0"/>
+              </a:ext>
+            </a:extLst>
+          </a:blip>
+          <a:stretch>
+            <a:fillRect/>
+          </a:stretch>
+        </p:blipFill>
+        <p:spPr>
+          <a:xfrm rot="10800000">
+            <a:off x="2099734" y="417940"/>
+            <a:ext cx="2679570" cy="4368865"/>
+          </a:xfrm>
+          <a:prstGeom prst="rect">
+            <a:avLst/>
+          </a:prstGeom>
+        </p:spPr>
+      </p:pic>
+    </p:spTree>
+    <p:extLst>
+      <p:ext uri="{BB962C8B-B14F-4D97-AF65-F5344CB8AC3E}">
+        <p14:creationId xmlns:p14="http://schemas.microsoft.com/office/powerpoint/2010/main" val="384009643"/>
+      </p:ext>
+    </p:extLst>
+  </p:cSld>
+  <p:clrMapOvr>
+    <a:masterClrMapping/>
+  </p:clrMapOvr>
+</p:sld>
+</file>
+
+<file path=ppt/slides/slide109.xml><?xml version="1.0" encoding="utf-8"?>
+<p:sld xmlns:a="http://schemas.openxmlformats.org/drawingml/2006/main" xmlns:r="http://schemas.openxmlformats.org/officeDocument/2006/relationships" xmlns:p="http://schemas.openxmlformats.org/presentationml/2006/main">
+  <p:cSld>
+    <p:spTree>
+      <p:nvGrpSpPr>
+        <p:cNvPr id="1" name=""/>
+        <p:cNvGrpSpPr/>
+        <p:nvPr/>
+      </p:nvGrpSpPr>
+      <p:grpSpPr>
+        <a:xfrm>
+          <a:off x="0" y="0"/>
+          <a:ext cx="0" cy="0"/>
+          <a:chOff x="0" y="0"/>
+          <a:chExt cx="0" cy="0"/>
+        </a:xfrm>
+      </p:grpSpPr>
+      <p:sp>
+        <p:nvSpPr>
+          <p:cNvPr id="6" name="Oval 5">
+            <a:extLst>
+              <a:ext uri="{FF2B5EF4-FFF2-40B4-BE49-F238E27FC236}">
+                <a16:creationId xmlns:a16="http://schemas.microsoft.com/office/drawing/2014/main" id="{13DA4EAA-6768-65DA-BD9B-781763A785E3}"/>
+              </a:ext>
+            </a:extLst>
+          </p:cNvPr>
+          <p:cNvSpPr/>
+          <p:nvPr/>
+        </p:nvSpPr>
+        <p:spPr>
+          <a:xfrm>
+            <a:off x="2080484" y="2092233"/>
+            <a:ext cx="2679570" cy="2656072"/>
+          </a:xfrm>
+          <a:prstGeom prst="ellipse">
+            <a:avLst/>
+          </a:prstGeom>
+          <a:solidFill>
+            <a:schemeClr val="tx1"/>
+          </a:solidFill>
+          <a:ln>
+            <a:solidFill>
+              <a:schemeClr val="tx1"/>
+            </a:solidFill>
+          </a:ln>
+        </p:spPr>
+        <p:style>
+          <a:lnRef idx="2">
+            <a:schemeClr val="accent1">
+              <a:shade val="50000"/>
+            </a:schemeClr>
+          </a:lnRef>
+          <a:fillRef idx="1">
+            <a:schemeClr val="accent1"/>
+          </a:fillRef>
+          <a:effectRef idx="0">
+            <a:schemeClr val="accent1"/>
+          </a:effectRef>
+          <a:fontRef idx="minor">
+            <a:schemeClr val="lt1"/>
+          </a:fontRef>
+        </p:style>
+        <p:txBody>
+          <a:bodyPr rtlCol="0" anchor="ctr"/>
+          <a:lstStyle/>
+          <a:p>
+            <a:pPr algn="ctr"/>
+            <a:endParaRPr lang="en-NZ"/>
+          </a:p>
+        </p:txBody>
+      </p:sp>
+      <p:sp>
+        <p:nvSpPr>
+          <p:cNvPr id="10" name="TextBox 9">
+            <a:extLst>
+              <a:ext uri="{FF2B5EF4-FFF2-40B4-BE49-F238E27FC236}">
+                <a16:creationId xmlns:a16="http://schemas.microsoft.com/office/drawing/2014/main" id="{27BE155E-8F85-643E-6B6E-2F1B446FA796}"/>
+              </a:ext>
+            </a:extLst>
+          </p:cNvPr>
+          <p:cNvSpPr txBox="1"/>
+          <p:nvPr/>
+        </p:nvSpPr>
+        <p:spPr>
+          <a:xfrm>
+            <a:off x="1182420" y="728005"/>
+            <a:ext cx="4475712" cy="1015663"/>
+          </a:xfrm>
+          <a:prstGeom prst="rect">
+            <a:avLst/>
+          </a:prstGeom>
+          <a:noFill/>
+        </p:spPr>
+        <p:txBody>
+          <a:bodyPr wrap="none" rtlCol="0">
+            <a:spAutoFit/>
+          </a:bodyPr>
+          <a:lstStyle/>
+          <a:p>
+            <a:pPr algn="ctr"/>
+            <a:r>
+              <a:rPr lang="en-NZ" sz="6000" dirty="0">
+                <a:solidFill>
+                  <a:schemeClr val="bg1"/>
+                </a:solidFill>
+              </a:rPr>
+              <a:t>ALERNATOR 3</a:t>
+            </a:r>
+          </a:p>
+        </p:txBody>
+      </p:sp>
+      <p:sp>
+        <p:nvSpPr>
+          <p:cNvPr id="12" name="TextBox 11">
+            <a:extLst>
+              <a:ext uri="{FF2B5EF4-FFF2-40B4-BE49-F238E27FC236}">
+                <a16:creationId xmlns:a16="http://schemas.microsoft.com/office/drawing/2014/main" id="{A48FA4B8-CA34-6531-B4CE-9A1F031D198D}"/>
+              </a:ext>
+            </a:extLst>
+          </p:cNvPr>
+          <p:cNvSpPr txBox="1"/>
+          <p:nvPr/>
+        </p:nvSpPr>
+        <p:spPr>
+          <a:xfrm>
+            <a:off x="2718793" y="5096870"/>
+            <a:ext cx="1402949" cy="1015663"/>
+          </a:xfrm>
+          <a:prstGeom prst="rect">
+            <a:avLst/>
+          </a:prstGeom>
+          <a:noFill/>
+        </p:spPr>
+        <p:txBody>
+          <a:bodyPr wrap="none" rtlCol="0">
+            <a:spAutoFit/>
+          </a:bodyPr>
+          <a:lstStyle/>
+          <a:p>
+            <a:pPr algn="ctr"/>
+            <a:r>
+              <a:rPr lang="en-NZ" sz="6000" dirty="0">
+                <a:solidFill>
+                  <a:schemeClr val="bg1"/>
+                </a:solidFill>
+              </a:rPr>
+              <a:t>OFF</a:t>
+            </a:r>
+          </a:p>
+        </p:txBody>
+      </p:sp>
+      <p:pic>
+        <p:nvPicPr>
+          <p:cNvPr id="5" name="Picture 4" descr="A picture containing still life photography, knob, light&#10;&#10;Description automatically generated">
+            <a:extLst>
+              <a:ext uri="{FF2B5EF4-FFF2-40B4-BE49-F238E27FC236}">
+                <a16:creationId xmlns:a16="http://schemas.microsoft.com/office/drawing/2014/main" id="{786007CA-863C-C697-2CF4-B1C06B14B355}"/>
+              </a:ext>
+            </a:extLst>
+          </p:cNvPr>
+          <p:cNvPicPr>
+            <a:picLocks noChangeAspect="1"/>
+          </p:cNvPicPr>
+          <p:nvPr/>
+        </p:nvPicPr>
+        <p:blipFill>
+          <a:blip r:embed="rId2">
+            <a:extLst>
+              <a:ext uri="{28A0092B-C50C-407E-A947-70E740481C1C}">
+                <a14:useLocalDpi xmlns:a14="http://schemas.microsoft.com/office/drawing/2010/main" val="0"/>
+              </a:ext>
+            </a:extLst>
+          </a:blip>
+          <a:stretch>
+            <a:fillRect/>
+          </a:stretch>
+        </p:blipFill>
+        <p:spPr>
+          <a:xfrm>
+            <a:off x="2080484" y="2092233"/>
+            <a:ext cx="2679570" cy="4368865"/>
+          </a:xfrm>
+          <a:prstGeom prst="rect">
+            <a:avLst/>
+          </a:prstGeom>
+        </p:spPr>
+      </p:pic>
+    </p:spTree>
+    <p:extLst>
+      <p:ext uri="{BB962C8B-B14F-4D97-AF65-F5344CB8AC3E}">
+        <p14:creationId xmlns:p14="http://schemas.microsoft.com/office/powerpoint/2010/main" val="1902955518"/>
+      </p:ext>
+    </p:extLst>
+  </p:cSld>
+  <p:clrMapOvr>
+    <a:masterClrMapping/>
+  </p:clrMapOvr>
+</p:sld>
+</file>
+
 <file path=ppt/slides/slide11.xml><?xml version="1.0" encoding="utf-8"?>
 <p:sld xmlns:a="http://schemas.openxmlformats.org/drawingml/2006/main" xmlns:r="http://schemas.openxmlformats.org/officeDocument/2006/relationships" xmlns:p="http://schemas.openxmlformats.org/presentationml/2006/main">
   <p:cSld>
@@ -3833,6 +5427,1896 @@
     <p:extLst>
       <p:ext uri="{BB962C8B-B14F-4D97-AF65-F5344CB8AC3E}">
         <p14:creationId xmlns:p14="http://schemas.microsoft.com/office/powerpoint/2010/main" val="3655292994"/>
+      </p:ext>
+    </p:extLst>
+  </p:cSld>
+  <p:clrMapOvr>
+    <a:masterClrMapping/>
+  </p:clrMapOvr>
+</p:sld>
+</file>
+
+<file path=ppt/slides/slide110.xml><?xml version="1.0" encoding="utf-8"?>
+<p:sld xmlns:a="http://schemas.openxmlformats.org/drawingml/2006/main" xmlns:r="http://schemas.openxmlformats.org/officeDocument/2006/relationships" xmlns:p="http://schemas.openxmlformats.org/presentationml/2006/main">
+  <p:cSld>
+    <p:spTree>
+      <p:nvGrpSpPr>
+        <p:cNvPr id="1" name=""/>
+        <p:cNvGrpSpPr/>
+        <p:nvPr/>
+      </p:nvGrpSpPr>
+      <p:grpSpPr>
+        <a:xfrm>
+          <a:off x="0" y="0"/>
+          <a:ext cx="0" cy="0"/>
+          <a:chOff x="0" y="0"/>
+          <a:chExt cx="0" cy="0"/>
+        </a:xfrm>
+      </p:grpSpPr>
+      <p:sp>
+        <p:nvSpPr>
+          <p:cNvPr id="6" name="Oval 5">
+            <a:extLst>
+              <a:ext uri="{FF2B5EF4-FFF2-40B4-BE49-F238E27FC236}">
+                <a16:creationId xmlns:a16="http://schemas.microsoft.com/office/drawing/2014/main" id="{13DA4EAA-6768-65DA-BD9B-781763A785E3}"/>
+              </a:ext>
+            </a:extLst>
+          </p:cNvPr>
+          <p:cNvSpPr/>
+          <p:nvPr/>
+        </p:nvSpPr>
+        <p:spPr>
+          <a:xfrm>
+            <a:off x="2080484" y="2092233"/>
+            <a:ext cx="2679570" cy="2656072"/>
+          </a:xfrm>
+          <a:prstGeom prst="ellipse">
+            <a:avLst/>
+          </a:prstGeom>
+          <a:solidFill>
+            <a:schemeClr val="tx1"/>
+          </a:solidFill>
+          <a:ln>
+            <a:solidFill>
+              <a:schemeClr val="tx1"/>
+            </a:solidFill>
+          </a:ln>
+        </p:spPr>
+        <p:style>
+          <a:lnRef idx="2">
+            <a:schemeClr val="accent1">
+              <a:shade val="50000"/>
+            </a:schemeClr>
+          </a:lnRef>
+          <a:fillRef idx="1">
+            <a:schemeClr val="accent1"/>
+          </a:fillRef>
+          <a:effectRef idx="0">
+            <a:schemeClr val="accent1"/>
+          </a:effectRef>
+          <a:fontRef idx="minor">
+            <a:schemeClr val="lt1"/>
+          </a:fontRef>
+        </p:style>
+        <p:txBody>
+          <a:bodyPr rtlCol="0" anchor="ctr"/>
+          <a:lstStyle/>
+          <a:p>
+            <a:pPr algn="ctr"/>
+            <a:endParaRPr lang="en-NZ"/>
+          </a:p>
+        </p:txBody>
+      </p:sp>
+      <p:sp>
+        <p:nvSpPr>
+          <p:cNvPr id="4" name="TextBox 3">
+            <a:extLst>
+              <a:ext uri="{FF2B5EF4-FFF2-40B4-BE49-F238E27FC236}">
+                <a16:creationId xmlns:a16="http://schemas.microsoft.com/office/drawing/2014/main" id="{120E1379-0638-3F09-2917-946BABB4CDA7}"/>
+              </a:ext>
+            </a:extLst>
+          </p:cNvPr>
+          <p:cNvSpPr txBox="1"/>
+          <p:nvPr/>
+        </p:nvSpPr>
+        <p:spPr>
+          <a:xfrm>
+            <a:off x="2718793" y="5096870"/>
+            <a:ext cx="1402949" cy="1015663"/>
+          </a:xfrm>
+          <a:prstGeom prst="rect">
+            <a:avLst/>
+          </a:prstGeom>
+          <a:noFill/>
+        </p:spPr>
+        <p:txBody>
+          <a:bodyPr wrap="none" rtlCol="0">
+            <a:spAutoFit/>
+          </a:bodyPr>
+          <a:lstStyle/>
+          <a:p>
+            <a:pPr algn="ctr"/>
+            <a:r>
+              <a:rPr lang="en-NZ" sz="6000" dirty="0">
+                <a:solidFill>
+                  <a:schemeClr val="bg1"/>
+                </a:solidFill>
+              </a:rPr>
+              <a:t>OFF</a:t>
+            </a:r>
+          </a:p>
+        </p:txBody>
+      </p:sp>
+      <p:sp>
+        <p:nvSpPr>
+          <p:cNvPr id="7" name="TextBox 6">
+            <a:extLst>
+              <a:ext uri="{FF2B5EF4-FFF2-40B4-BE49-F238E27FC236}">
+                <a16:creationId xmlns:a16="http://schemas.microsoft.com/office/drawing/2014/main" id="{F00287A5-C6ED-068D-998E-A0CC691D3635}"/>
+              </a:ext>
+            </a:extLst>
+          </p:cNvPr>
+          <p:cNvSpPr txBox="1"/>
+          <p:nvPr/>
+        </p:nvSpPr>
+        <p:spPr>
+          <a:xfrm>
+            <a:off x="1023051" y="728005"/>
+            <a:ext cx="4794454" cy="1015663"/>
+          </a:xfrm>
+          <a:prstGeom prst="rect">
+            <a:avLst/>
+          </a:prstGeom>
+          <a:noFill/>
+        </p:spPr>
+        <p:txBody>
+          <a:bodyPr wrap="none" rtlCol="0">
+            <a:spAutoFit/>
+          </a:bodyPr>
+          <a:lstStyle/>
+          <a:p>
+            <a:pPr algn="ctr"/>
+            <a:r>
+              <a:rPr lang="en-NZ" sz="6000" dirty="0">
+                <a:solidFill>
+                  <a:schemeClr val="bg1"/>
+                </a:solidFill>
+              </a:rPr>
+              <a:t>ALTERNATOR 3</a:t>
+            </a:r>
+          </a:p>
+        </p:txBody>
+      </p:sp>
+      <p:pic>
+        <p:nvPicPr>
+          <p:cNvPr id="5" name="Picture 4" descr="A picture containing still life photography, knob, light&#10;&#10;Description automatically generated">
+            <a:extLst>
+              <a:ext uri="{FF2B5EF4-FFF2-40B4-BE49-F238E27FC236}">
+                <a16:creationId xmlns:a16="http://schemas.microsoft.com/office/drawing/2014/main" id="{786007CA-863C-C697-2CF4-B1C06B14B355}"/>
+              </a:ext>
+            </a:extLst>
+          </p:cNvPr>
+          <p:cNvPicPr>
+            <a:picLocks noChangeAspect="1"/>
+          </p:cNvPicPr>
+          <p:nvPr/>
+        </p:nvPicPr>
+        <p:blipFill>
+          <a:blip r:embed="rId2">
+            <a:extLst>
+              <a:ext uri="{28A0092B-C50C-407E-A947-70E740481C1C}">
+                <a14:useLocalDpi xmlns:a14="http://schemas.microsoft.com/office/drawing/2010/main" val="0"/>
+              </a:ext>
+            </a:extLst>
+          </a:blip>
+          <a:stretch>
+            <a:fillRect/>
+          </a:stretch>
+        </p:blipFill>
+        <p:spPr>
+          <a:xfrm rot="10800000">
+            <a:off x="2099734" y="417940"/>
+            <a:ext cx="2679570" cy="4368865"/>
+          </a:xfrm>
+          <a:prstGeom prst="rect">
+            <a:avLst/>
+          </a:prstGeom>
+        </p:spPr>
+      </p:pic>
+    </p:spTree>
+    <p:extLst>
+      <p:ext uri="{BB962C8B-B14F-4D97-AF65-F5344CB8AC3E}">
+        <p14:creationId xmlns:p14="http://schemas.microsoft.com/office/powerpoint/2010/main" val="4193808172"/>
+      </p:ext>
+    </p:extLst>
+  </p:cSld>
+  <p:clrMapOvr>
+    <a:masterClrMapping/>
+  </p:clrMapOvr>
+</p:sld>
+</file>
+
+<file path=ppt/slides/slide111.xml><?xml version="1.0" encoding="utf-8"?>
+<p:sld xmlns:a="http://schemas.openxmlformats.org/drawingml/2006/main" xmlns:r="http://schemas.openxmlformats.org/officeDocument/2006/relationships" xmlns:p="http://schemas.openxmlformats.org/presentationml/2006/main">
+  <p:cSld>
+    <p:spTree>
+      <p:nvGrpSpPr>
+        <p:cNvPr id="1" name=""/>
+        <p:cNvGrpSpPr/>
+        <p:nvPr/>
+      </p:nvGrpSpPr>
+      <p:grpSpPr>
+        <a:xfrm>
+          <a:off x="0" y="0"/>
+          <a:ext cx="0" cy="0"/>
+          <a:chOff x="0" y="0"/>
+          <a:chExt cx="0" cy="0"/>
+        </a:xfrm>
+      </p:grpSpPr>
+      <p:sp>
+        <p:nvSpPr>
+          <p:cNvPr id="6" name="Oval 5">
+            <a:extLst>
+              <a:ext uri="{FF2B5EF4-FFF2-40B4-BE49-F238E27FC236}">
+                <a16:creationId xmlns:a16="http://schemas.microsoft.com/office/drawing/2014/main" id="{13DA4EAA-6768-65DA-BD9B-781763A785E3}"/>
+              </a:ext>
+            </a:extLst>
+          </p:cNvPr>
+          <p:cNvSpPr/>
+          <p:nvPr/>
+        </p:nvSpPr>
+        <p:spPr>
+          <a:xfrm>
+            <a:off x="2080484" y="2092233"/>
+            <a:ext cx="2679570" cy="2656072"/>
+          </a:xfrm>
+          <a:prstGeom prst="ellipse">
+            <a:avLst/>
+          </a:prstGeom>
+          <a:solidFill>
+            <a:schemeClr val="tx1"/>
+          </a:solidFill>
+          <a:ln>
+            <a:solidFill>
+              <a:schemeClr val="tx1"/>
+            </a:solidFill>
+          </a:ln>
+        </p:spPr>
+        <p:style>
+          <a:lnRef idx="2">
+            <a:schemeClr val="accent1">
+              <a:shade val="50000"/>
+            </a:schemeClr>
+          </a:lnRef>
+          <a:fillRef idx="1">
+            <a:schemeClr val="accent1"/>
+          </a:fillRef>
+          <a:effectRef idx="0">
+            <a:schemeClr val="accent1"/>
+          </a:effectRef>
+          <a:fontRef idx="minor">
+            <a:schemeClr val="lt1"/>
+          </a:fontRef>
+        </p:style>
+        <p:txBody>
+          <a:bodyPr rtlCol="0" anchor="ctr"/>
+          <a:lstStyle/>
+          <a:p>
+            <a:pPr algn="ctr"/>
+            <a:endParaRPr lang="en-NZ"/>
+          </a:p>
+        </p:txBody>
+      </p:sp>
+      <p:sp>
+        <p:nvSpPr>
+          <p:cNvPr id="10" name="TextBox 9">
+            <a:extLst>
+              <a:ext uri="{FF2B5EF4-FFF2-40B4-BE49-F238E27FC236}">
+                <a16:creationId xmlns:a16="http://schemas.microsoft.com/office/drawing/2014/main" id="{27BE155E-8F85-643E-6B6E-2F1B446FA796}"/>
+              </a:ext>
+            </a:extLst>
+          </p:cNvPr>
+          <p:cNvSpPr txBox="1"/>
+          <p:nvPr/>
+        </p:nvSpPr>
+        <p:spPr>
+          <a:xfrm>
+            <a:off x="1182420" y="728005"/>
+            <a:ext cx="4475712" cy="1015663"/>
+          </a:xfrm>
+          <a:prstGeom prst="rect">
+            <a:avLst/>
+          </a:prstGeom>
+          <a:noFill/>
+        </p:spPr>
+        <p:txBody>
+          <a:bodyPr wrap="none" rtlCol="0">
+            <a:spAutoFit/>
+          </a:bodyPr>
+          <a:lstStyle/>
+          <a:p>
+            <a:pPr algn="ctr"/>
+            <a:r>
+              <a:rPr lang="en-NZ" sz="6000" dirty="0">
+                <a:solidFill>
+                  <a:schemeClr val="bg1"/>
+                </a:solidFill>
+              </a:rPr>
+              <a:t>ALERNATOR 4</a:t>
+            </a:r>
+          </a:p>
+        </p:txBody>
+      </p:sp>
+      <p:sp>
+        <p:nvSpPr>
+          <p:cNvPr id="12" name="TextBox 11">
+            <a:extLst>
+              <a:ext uri="{FF2B5EF4-FFF2-40B4-BE49-F238E27FC236}">
+                <a16:creationId xmlns:a16="http://schemas.microsoft.com/office/drawing/2014/main" id="{A48FA4B8-CA34-6531-B4CE-9A1F031D198D}"/>
+              </a:ext>
+            </a:extLst>
+          </p:cNvPr>
+          <p:cNvSpPr txBox="1"/>
+          <p:nvPr/>
+        </p:nvSpPr>
+        <p:spPr>
+          <a:xfrm>
+            <a:off x="2718793" y="5096870"/>
+            <a:ext cx="1402949" cy="1015663"/>
+          </a:xfrm>
+          <a:prstGeom prst="rect">
+            <a:avLst/>
+          </a:prstGeom>
+          <a:noFill/>
+        </p:spPr>
+        <p:txBody>
+          <a:bodyPr wrap="none" rtlCol="0">
+            <a:spAutoFit/>
+          </a:bodyPr>
+          <a:lstStyle/>
+          <a:p>
+            <a:pPr algn="ctr"/>
+            <a:r>
+              <a:rPr lang="en-NZ" sz="6000" dirty="0">
+                <a:solidFill>
+                  <a:schemeClr val="bg1"/>
+                </a:solidFill>
+              </a:rPr>
+              <a:t>OFF</a:t>
+            </a:r>
+          </a:p>
+        </p:txBody>
+      </p:sp>
+      <p:pic>
+        <p:nvPicPr>
+          <p:cNvPr id="5" name="Picture 4" descr="A picture containing still life photography, knob, light&#10;&#10;Description automatically generated">
+            <a:extLst>
+              <a:ext uri="{FF2B5EF4-FFF2-40B4-BE49-F238E27FC236}">
+                <a16:creationId xmlns:a16="http://schemas.microsoft.com/office/drawing/2014/main" id="{786007CA-863C-C697-2CF4-B1C06B14B355}"/>
+              </a:ext>
+            </a:extLst>
+          </p:cNvPr>
+          <p:cNvPicPr>
+            <a:picLocks noChangeAspect="1"/>
+          </p:cNvPicPr>
+          <p:nvPr/>
+        </p:nvPicPr>
+        <p:blipFill>
+          <a:blip r:embed="rId2">
+            <a:extLst>
+              <a:ext uri="{28A0092B-C50C-407E-A947-70E740481C1C}">
+                <a14:useLocalDpi xmlns:a14="http://schemas.microsoft.com/office/drawing/2010/main" val="0"/>
+              </a:ext>
+            </a:extLst>
+          </a:blip>
+          <a:stretch>
+            <a:fillRect/>
+          </a:stretch>
+        </p:blipFill>
+        <p:spPr>
+          <a:xfrm>
+            <a:off x="2080484" y="2092233"/>
+            <a:ext cx="2679570" cy="4368865"/>
+          </a:xfrm>
+          <a:prstGeom prst="rect">
+            <a:avLst/>
+          </a:prstGeom>
+        </p:spPr>
+      </p:pic>
+    </p:spTree>
+    <p:extLst>
+      <p:ext uri="{BB962C8B-B14F-4D97-AF65-F5344CB8AC3E}">
+        <p14:creationId xmlns:p14="http://schemas.microsoft.com/office/powerpoint/2010/main" val="3115914518"/>
+      </p:ext>
+    </p:extLst>
+  </p:cSld>
+  <p:clrMapOvr>
+    <a:masterClrMapping/>
+  </p:clrMapOvr>
+</p:sld>
+</file>
+
+<file path=ppt/slides/slide112.xml><?xml version="1.0" encoding="utf-8"?>
+<p:sld xmlns:a="http://schemas.openxmlformats.org/drawingml/2006/main" xmlns:r="http://schemas.openxmlformats.org/officeDocument/2006/relationships" xmlns:p="http://schemas.openxmlformats.org/presentationml/2006/main">
+  <p:cSld>
+    <p:spTree>
+      <p:nvGrpSpPr>
+        <p:cNvPr id="1" name=""/>
+        <p:cNvGrpSpPr/>
+        <p:nvPr/>
+      </p:nvGrpSpPr>
+      <p:grpSpPr>
+        <a:xfrm>
+          <a:off x="0" y="0"/>
+          <a:ext cx="0" cy="0"/>
+          <a:chOff x="0" y="0"/>
+          <a:chExt cx="0" cy="0"/>
+        </a:xfrm>
+      </p:grpSpPr>
+      <p:sp>
+        <p:nvSpPr>
+          <p:cNvPr id="6" name="Oval 5">
+            <a:extLst>
+              <a:ext uri="{FF2B5EF4-FFF2-40B4-BE49-F238E27FC236}">
+                <a16:creationId xmlns:a16="http://schemas.microsoft.com/office/drawing/2014/main" id="{13DA4EAA-6768-65DA-BD9B-781763A785E3}"/>
+              </a:ext>
+            </a:extLst>
+          </p:cNvPr>
+          <p:cNvSpPr/>
+          <p:nvPr/>
+        </p:nvSpPr>
+        <p:spPr>
+          <a:xfrm>
+            <a:off x="2080484" y="2092233"/>
+            <a:ext cx="2679570" cy="2656072"/>
+          </a:xfrm>
+          <a:prstGeom prst="ellipse">
+            <a:avLst/>
+          </a:prstGeom>
+          <a:solidFill>
+            <a:schemeClr val="tx1"/>
+          </a:solidFill>
+          <a:ln>
+            <a:solidFill>
+              <a:schemeClr val="tx1"/>
+            </a:solidFill>
+          </a:ln>
+        </p:spPr>
+        <p:style>
+          <a:lnRef idx="2">
+            <a:schemeClr val="accent1">
+              <a:shade val="50000"/>
+            </a:schemeClr>
+          </a:lnRef>
+          <a:fillRef idx="1">
+            <a:schemeClr val="accent1"/>
+          </a:fillRef>
+          <a:effectRef idx="0">
+            <a:schemeClr val="accent1"/>
+          </a:effectRef>
+          <a:fontRef idx="minor">
+            <a:schemeClr val="lt1"/>
+          </a:fontRef>
+        </p:style>
+        <p:txBody>
+          <a:bodyPr rtlCol="0" anchor="ctr"/>
+          <a:lstStyle/>
+          <a:p>
+            <a:pPr algn="ctr"/>
+            <a:endParaRPr lang="en-NZ"/>
+          </a:p>
+        </p:txBody>
+      </p:sp>
+      <p:sp>
+        <p:nvSpPr>
+          <p:cNvPr id="4" name="TextBox 3">
+            <a:extLst>
+              <a:ext uri="{FF2B5EF4-FFF2-40B4-BE49-F238E27FC236}">
+                <a16:creationId xmlns:a16="http://schemas.microsoft.com/office/drawing/2014/main" id="{120E1379-0638-3F09-2917-946BABB4CDA7}"/>
+              </a:ext>
+            </a:extLst>
+          </p:cNvPr>
+          <p:cNvSpPr txBox="1"/>
+          <p:nvPr/>
+        </p:nvSpPr>
+        <p:spPr>
+          <a:xfrm>
+            <a:off x="2718793" y="5096870"/>
+            <a:ext cx="1402949" cy="1015663"/>
+          </a:xfrm>
+          <a:prstGeom prst="rect">
+            <a:avLst/>
+          </a:prstGeom>
+          <a:noFill/>
+        </p:spPr>
+        <p:txBody>
+          <a:bodyPr wrap="none" rtlCol="0">
+            <a:spAutoFit/>
+          </a:bodyPr>
+          <a:lstStyle/>
+          <a:p>
+            <a:pPr algn="ctr"/>
+            <a:r>
+              <a:rPr lang="en-NZ" sz="6000" dirty="0">
+                <a:solidFill>
+                  <a:schemeClr val="bg1"/>
+                </a:solidFill>
+              </a:rPr>
+              <a:t>OFF</a:t>
+            </a:r>
+          </a:p>
+        </p:txBody>
+      </p:sp>
+      <p:sp>
+        <p:nvSpPr>
+          <p:cNvPr id="7" name="TextBox 6">
+            <a:extLst>
+              <a:ext uri="{FF2B5EF4-FFF2-40B4-BE49-F238E27FC236}">
+                <a16:creationId xmlns:a16="http://schemas.microsoft.com/office/drawing/2014/main" id="{F00287A5-C6ED-068D-998E-A0CC691D3635}"/>
+              </a:ext>
+            </a:extLst>
+          </p:cNvPr>
+          <p:cNvSpPr txBox="1"/>
+          <p:nvPr/>
+        </p:nvSpPr>
+        <p:spPr>
+          <a:xfrm>
+            <a:off x="1023051" y="728005"/>
+            <a:ext cx="4794454" cy="1015663"/>
+          </a:xfrm>
+          <a:prstGeom prst="rect">
+            <a:avLst/>
+          </a:prstGeom>
+          <a:noFill/>
+        </p:spPr>
+        <p:txBody>
+          <a:bodyPr wrap="none" rtlCol="0">
+            <a:spAutoFit/>
+          </a:bodyPr>
+          <a:lstStyle/>
+          <a:p>
+            <a:pPr algn="ctr"/>
+            <a:r>
+              <a:rPr lang="en-NZ" sz="6000" dirty="0">
+                <a:solidFill>
+                  <a:schemeClr val="bg1"/>
+                </a:solidFill>
+              </a:rPr>
+              <a:t>ALTERNATOR 4</a:t>
+            </a:r>
+          </a:p>
+        </p:txBody>
+      </p:sp>
+      <p:pic>
+        <p:nvPicPr>
+          <p:cNvPr id="5" name="Picture 4" descr="A picture containing still life photography, knob, light&#10;&#10;Description automatically generated">
+            <a:extLst>
+              <a:ext uri="{FF2B5EF4-FFF2-40B4-BE49-F238E27FC236}">
+                <a16:creationId xmlns:a16="http://schemas.microsoft.com/office/drawing/2014/main" id="{786007CA-863C-C697-2CF4-B1C06B14B355}"/>
+              </a:ext>
+            </a:extLst>
+          </p:cNvPr>
+          <p:cNvPicPr>
+            <a:picLocks noChangeAspect="1"/>
+          </p:cNvPicPr>
+          <p:nvPr/>
+        </p:nvPicPr>
+        <p:blipFill>
+          <a:blip r:embed="rId2">
+            <a:extLst>
+              <a:ext uri="{28A0092B-C50C-407E-A947-70E740481C1C}">
+                <a14:useLocalDpi xmlns:a14="http://schemas.microsoft.com/office/drawing/2010/main" val="0"/>
+              </a:ext>
+            </a:extLst>
+          </a:blip>
+          <a:stretch>
+            <a:fillRect/>
+          </a:stretch>
+        </p:blipFill>
+        <p:spPr>
+          <a:xfrm rot="10800000">
+            <a:off x="2099734" y="417940"/>
+            <a:ext cx="2679570" cy="4368865"/>
+          </a:xfrm>
+          <a:prstGeom prst="rect">
+            <a:avLst/>
+          </a:prstGeom>
+        </p:spPr>
+      </p:pic>
+    </p:spTree>
+    <p:extLst>
+      <p:ext uri="{BB962C8B-B14F-4D97-AF65-F5344CB8AC3E}">
+        <p14:creationId xmlns:p14="http://schemas.microsoft.com/office/powerpoint/2010/main" val="3627550132"/>
+      </p:ext>
+    </p:extLst>
+  </p:cSld>
+  <p:clrMapOvr>
+    <a:masterClrMapping/>
+  </p:clrMapOvr>
+</p:sld>
+</file>
+
+<file path=ppt/slides/slide113.xml><?xml version="1.0" encoding="utf-8"?>
+<p:sld xmlns:a="http://schemas.openxmlformats.org/drawingml/2006/main" xmlns:r="http://schemas.openxmlformats.org/officeDocument/2006/relationships" xmlns:p="http://schemas.openxmlformats.org/presentationml/2006/main">
+  <p:cSld>
+    <p:spTree>
+      <p:nvGrpSpPr>
+        <p:cNvPr id="1" name=""/>
+        <p:cNvGrpSpPr/>
+        <p:nvPr/>
+      </p:nvGrpSpPr>
+      <p:grpSpPr>
+        <a:xfrm>
+          <a:off x="0" y="0"/>
+          <a:ext cx="0" cy="0"/>
+          <a:chOff x="0" y="0"/>
+          <a:chExt cx="0" cy="0"/>
+        </a:xfrm>
+      </p:grpSpPr>
+      <p:sp>
+        <p:nvSpPr>
+          <p:cNvPr id="6" name="Oval 5">
+            <a:extLst>
+              <a:ext uri="{FF2B5EF4-FFF2-40B4-BE49-F238E27FC236}">
+                <a16:creationId xmlns:a16="http://schemas.microsoft.com/office/drawing/2014/main" id="{13DA4EAA-6768-65DA-BD9B-781763A785E3}"/>
+              </a:ext>
+            </a:extLst>
+          </p:cNvPr>
+          <p:cNvSpPr/>
+          <p:nvPr/>
+        </p:nvSpPr>
+        <p:spPr>
+          <a:xfrm>
+            <a:off x="2080484" y="2092233"/>
+            <a:ext cx="2679570" cy="2656072"/>
+          </a:xfrm>
+          <a:prstGeom prst="ellipse">
+            <a:avLst/>
+          </a:prstGeom>
+          <a:solidFill>
+            <a:schemeClr val="tx1"/>
+          </a:solidFill>
+          <a:ln>
+            <a:solidFill>
+              <a:schemeClr val="tx1"/>
+            </a:solidFill>
+          </a:ln>
+        </p:spPr>
+        <p:style>
+          <a:lnRef idx="2">
+            <a:schemeClr val="accent1">
+              <a:shade val="50000"/>
+            </a:schemeClr>
+          </a:lnRef>
+          <a:fillRef idx="1">
+            <a:schemeClr val="accent1"/>
+          </a:fillRef>
+          <a:effectRef idx="0">
+            <a:schemeClr val="accent1"/>
+          </a:effectRef>
+          <a:fontRef idx="minor">
+            <a:schemeClr val="lt1"/>
+          </a:fontRef>
+        </p:style>
+        <p:txBody>
+          <a:bodyPr rtlCol="0" anchor="ctr"/>
+          <a:lstStyle/>
+          <a:p>
+            <a:pPr algn="ctr"/>
+            <a:endParaRPr lang="en-NZ"/>
+          </a:p>
+        </p:txBody>
+      </p:sp>
+      <p:sp>
+        <p:nvSpPr>
+          <p:cNvPr id="10" name="TextBox 9">
+            <a:extLst>
+              <a:ext uri="{FF2B5EF4-FFF2-40B4-BE49-F238E27FC236}">
+                <a16:creationId xmlns:a16="http://schemas.microsoft.com/office/drawing/2014/main" id="{27BE155E-8F85-643E-6B6E-2F1B446FA796}"/>
+              </a:ext>
+            </a:extLst>
+          </p:cNvPr>
+          <p:cNvSpPr txBox="1"/>
+          <p:nvPr/>
+        </p:nvSpPr>
+        <p:spPr>
+          <a:xfrm>
+            <a:off x="1305168" y="140582"/>
+            <a:ext cx="4230197" cy="1938992"/>
+          </a:xfrm>
+          <a:prstGeom prst="rect">
+            <a:avLst/>
+          </a:prstGeom>
+          <a:noFill/>
+        </p:spPr>
+        <p:txBody>
+          <a:bodyPr wrap="none" rtlCol="0">
+            <a:spAutoFit/>
+          </a:bodyPr>
+          <a:lstStyle/>
+          <a:p>
+            <a:pPr algn="ctr"/>
+            <a:r>
+              <a:rPr lang="en-NZ" sz="6000" dirty="0">
+                <a:solidFill>
+                  <a:schemeClr val="bg1"/>
+                </a:solidFill>
+              </a:rPr>
+              <a:t>LEFT</a:t>
+            </a:r>
+            <a:br>
+              <a:rPr lang="en-NZ" sz="6000" dirty="0">
+                <a:solidFill>
+                  <a:schemeClr val="bg1"/>
+                </a:solidFill>
+              </a:rPr>
+            </a:br>
+            <a:r>
+              <a:rPr lang="en-NZ" sz="6000" dirty="0">
+                <a:solidFill>
+                  <a:schemeClr val="bg1"/>
+                </a:solidFill>
+              </a:rPr>
+              <a:t>ALTERNATOR</a:t>
+            </a:r>
+          </a:p>
+        </p:txBody>
+      </p:sp>
+      <p:sp>
+        <p:nvSpPr>
+          <p:cNvPr id="12" name="TextBox 11">
+            <a:extLst>
+              <a:ext uri="{FF2B5EF4-FFF2-40B4-BE49-F238E27FC236}">
+                <a16:creationId xmlns:a16="http://schemas.microsoft.com/office/drawing/2014/main" id="{A48FA4B8-CA34-6531-B4CE-9A1F031D198D}"/>
+              </a:ext>
+            </a:extLst>
+          </p:cNvPr>
+          <p:cNvSpPr txBox="1"/>
+          <p:nvPr/>
+        </p:nvSpPr>
+        <p:spPr>
+          <a:xfrm>
+            <a:off x="2718793" y="5096870"/>
+            <a:ext cx="1402949" cy="1015663"/>
+          </a:xfrm>
+          <a:prstGeom prst="rect">
+            <a:avLst/>
+          </a:prstGeom>
+          <a:noFill/>
+        </p:spPr>
+        <p:txBody>
+          <a:bodyPr wrap="none" rtlCol="0">
+            <a:spAutoFit/>
+          </a:bodyPr>
+          <a:lstStyle/>
+          <a:p>
+            <a:pPr algn="ctr"/>
+            <a:r>
+              <a:rPr lang="en-NZ" sz="6000" dirty="0">
+                <a:solidFill>
+                  <a:schemeClr val="bg1"/>
+                </a:solidFill>
+              </a:rPr>
+              <a:t>OFF</a:t>
+            </a:r>
+          </a:p>
+        </p:txBody>
+      </p:sp>
+      <p:pic>
+        <p:nvPicPr>
+          <p:cNvPr id="5" name="Picture 4" descr="A picture containing still life photography, knob, light&#10;&#10;Description automatically generated">
+            <a:extLst>
+              <a:ext uri="{FF2B5EF4-FFF2-40B4-BE49-F238E27FC236}">
+                <a16:creationId xmlns:a16="http://schemas.microsoft.com/office/drawing/2014/main" id="{786007CA-863C-C697-2CF4-B1C06B14B355}"/>
+              </a:ext>
+            </a:extLst>
+          </p:cNvPr>
+          <p:cNvPicPr>
+            <a:picLocks noChangeAspect="1"/>
+          </p:cNvPicPr>
+          <p:nvPr/>
+        </p:nvPicPr>
+        <p:blipFill>
+          <a:blip r:embed="rId2">
+            <a:extLst>
+              <a:ext uri="{28A0092B-C50C-407E-A947-70E740481C1C}">
+                <a14:useLocalDpi xmlns:a14="http://schemas.microsoft.com/office/drawing/2010/main" val="0"/>
+              </a:ext>
+            </a:extLst>
+          </a:blip>
+          <a:stretch>
+            <a:fillRect/>
+          </a:stretch>
+        </p:blipFill>
+        <p:spPr>
+          <a:xfrm>
+            <a:off x="2080484" y="2092233"/>
+            <a:ext cx="2679570" cy="4368865"/>
+          </a:xfrm>
+          <a:prstGeom prst="rect">
+            <a:avLst/>
+          </a:prstGeom>
+        </p:spPr>
+      </p:pic>
+    </p:spTree>
+    <p:extLst>
+      <p:ext uri="{BB962C8B-B14F-4D97-AF65-F5344CB8AC3E}">
+        <p14:creationId xmlns:p14="http://schemas.microsoft.com/office/powerpoint/2010/main" val="738220829"/>
+      </p:ext>
+    </p:extLst>
+  </p:cSld>
+  <p:clrMapOvr>
+    <a:masterClrMapping/>
+  </p:clrMapOvr>
+</p:sld>
+</file>
+
+<file path=ppt/slides/slide114.xml><?xml version="1.0" encoding="utf-8"?>
+<p:sld xmlns:a="http://schemas.openxmlformats.org/drawingml/2006/main" xmlns:r="http://schemas.openxmlformats.org/officeDocument/2006/relationships" xmlns:p="http://schemas.openxmlformats.org/presentationml/2006/main">
+  <p:cSld>
+    <p:spTree>
+      <p:nvGrpSpPr>
+        <p:cNvPr id="1" name=""/>
+        <p:cNvGrpSpPr/>
+        <p:nvPr/>
+      </p:nvGrpSpPr>
+      <p:grpSpPr>
+        <a:xfrm>
+          <a:off x="0" y="0"/>
+          <a:ext cx="0" cy="0"/>
+          <a:chOff x="0" y="0"/>
+          <a:chExt cx="0" cy="0"/>
+        </a:xfrm>
+      </p:grpSpPr>
+      <p:sp>
+        <p:nvSpPr>
+          <p:cNvPr id="6" name="Oval 5">
+            <a:extLst>
+              <a:ext uri="{FF2B5EF4-FFF2-40B4-BE49-F238E27FC236}">
+                <a16:creationId xmlns:a16="http://schemas.microsoft.com/office/drawing/2014/main" id="{13DA4EAA-6768-65DA-BD9B-781763A785E3}"/>
+              </a:ext>
+            </a:extLst>
+          </p:cNvPr>
+          <p:cNvSpPr/>
+          <p:nvPr/>
+        </p:nvSpPr>
+        <p:spPr>
+          <a:xfrm>
+            <a:off x="2080484" y="2092233"/>
+            <a:ext cx="2679570" cy="2656072"/>
+          </a:xfrm>
+          <a:prstGeom prst="ellipse">
+            <a:avLst/>
+          </a:prstGeom>
+          <a:solidFill>
+            <a:schemeClr val="tx1"/>
+          </a:solidFill>
+          <a:ln>
+            <a:solidFill>
+              <a:schemeClr val="tx1"/>
+            </a:solidFill>
+          </a:ln>
+        </p:spPr>
+        <p:style>
+          <a:lnRef idx="2">
+            <a:schemeClr val="accent1">
+              <a:shade val="50000"/>
+            </a:schemeClr>
+          </a:lnRef>
+          <a:fillRef idx="1">
+            <a:schemeClr val="accent1"/>
+          </a:fillRef>
+          <a:effectRef idx="0">
+            <a:schemeClr val="accent1"/>
+          </a:effectRef>
+          <a:fontRef idx="minor">
+            <a:schemeClr val="lt1"/>
+          </a:fontRef>
+        </p:style>
+        <p:txBody>
+          <a:bodyPr rtlCol="0" anchor="ctr"/>
+          <a:lstStyle/>
+          <a:p>
+            <a:pPr algn="ctr"/>
+            <a:endParaRPr lang="en-NZ"/>
+          </a:p>
+        </p:txBody>
+      </p:sp>
+      <p:sp>
+        <p:nvSpPr>
+          <p:cNvPr id="4" name="TextBox 3">
+            <a:extLst>
+              <a:ext uri="{FF2B5EF4-FFF2-40B4-BE49-F238E27FC236}">
+                <a16:creationId xmlns:a16="http://schemas.microsoft.com/office/drawing/2014/main" id="{120E1379-0638-3F09-2917-946BABB4CDA7}"/>
+              </a:ext>
+            </a:extLst>
+          </p:cNvPr>
+          <p:cNvSpPr txBox="1"/>
+          <p:nvPr/>
+        </p:nvSpPr>
+        <p:spPr>
+          <a:xfrm>
+            <a:off x="2718793" y="5096870"/>
+            <a:ext cx="1402949" cy="1015663"/>
+          </a:xfrm>
+          <a:prstGeom prst="rect">
+            <a:avLst/>
+          </a:prstGeom>
+          <a:noFill/>
+        </p:spPr>
+        <p:txBody>
+          <a:bodyPr wrap="none" rtlCol="0">
+            <a:spAutoFit/>
+          </a:bodyPr>
+          <a:lstStyle/>
+          <a:p>
+            <a:pPr algn="ctr"/>
+            <a:r>
+              <a:rPr lang="en-NZ" sz="6000" dirty="0">
+                <a:solidFill>
+                  <a:schemeClr val="bg1"/>
+                </a:solidFill>
+              </a:rPr>
+              <a:t>OFF</a:t>
+            </a:r>
+          </a:p>
+        </p:txBody>
+      </p:sp>
+      <p:sp>
+        <p:nvSpPr>
+          <p:cNvPr id="7" name="TextBox 6">
+            <a:extLst>
+              <a:ext uri="{FF2B5EF4-FFF2-40B4-BE49-F238E27FC236}">
+                <a16:creationId xmlns:a16="http://schemas.microsoft.com/office/drawing/2014/main" id="{F00287A5-C6ED-068D-998E-A0CC691D3635}"/>
+              </a:ext>
+            </a:extLst>
+          </p:cNvPr>
+          <p:cNvSpPr txBox="1"/>
+          <p:nvPr/>
+        </p:nvSpPr>
+        <p:spPr>
+          <a:xfrm>
+            <a:off x="1305168" y="140937"/>
+            <a:ext cx="4230197" cy="1938992"/>
+          </a:xfrm>
+          <a:prstGeom prst="rect">
+            <a:avLst/>
+          </a:prstGeom>
+          <a:noFill/>
+        </p:spPr>
+        <p:txBody>
+          <a:bodyPr wrap="none" rtlCol="0">
+            <a:spAutoFit/>
+          </a:bodyPr>
+          <a:lstStyle/>
+          <a:p>
+            <a:pPr algn="ctr"/>
+            <a:r>
+              <a:rPr lang="en-NZ" sz="6000" dirty="0">
+                <a:solidFill>
+                  <a:schemeClr val="bg1"/>
+                </a:solidFill>
+              </a:rPr>
+              <a:t>LEFT</a:t>
+            </a:r>
+            <a:br>
+              <a:rPr lang="en-NZ" sz="6000" dirty="0">
+                <a:solidFill>
+                  <a:schemeClr val="bg1"/>
+                </a:solidFill>
+              </a:rPr>
+            </a:br>
+            <a:r>
+              <a:rPr lang="en-NZ" sz="6000" dirty="0">
+                <a:solidFill>
+                  <a:schemeClr val="bg1"/>
+                </a:solidFill>
+              </a:rPr>
+              <a:t>ALTERNATOR</a:t>
+            </a:r>
+          </a:p>
+        </p:txBody>
+      </p:sp>
+      <p:pic>
+        <p:nvPicPr>
+          <p:cNvPr id="5" name="Picture 4" descr="A picture containing still life photography, knob, light&#10;&#10;Description automatically generated">
+            <a:extLst>
+              <a:ext uri="{FF2B5EF4-FFF2-40B4-BE49-F238E27FC236}">
+                <a16:creationId xmlns:a16="http://schemas.microsoft.com/office/drawing/2014/main" id="{786007CA-863C-C697-2CF4-B1C06B14B355}"/>
+              </a:ext>
+            </a:extLst>
+          </p:cNvPr>
+          <p:cNvPicPr>
+            <a:picLocks noChangeAspect="1"/>
+          </p:cNvPicPr>
+          <p:nvPr/>
+        </p:nvPicPr>
+        <p:blipFill>
+          <a:blip r:embed="rId2">
+            <a:extLst>
+              <a:ext uri="{28A0092B-C50C-407E-A947-70E740481C1C}">
+                <a14:useLocalDpi xmlns:a14="http://schemas.microsoft.com/office/drawing/2010/main" val="0"/>
+              </a:ext>
+            </a:extLst>
+          </a:blip>
+          <a:stretch>
+            <a:fillRect/>
+          </a:stretch>
+        </p:blipFill>
+        <p:spPr>
+          <a:xfrm rot="10800000">
+            <a:off x="2099734" y="417940"/>
+            <a:ext cx="2679570" cy="4368865"/>
+          </a:xfrm>
+          <a:prstGeom prst="rect">
+            <a:avLst/>
+          </a:prstGeom>
+        </p:spPr>
+      </p:pic>
+    </p:spTree>
+    <p:extLst>
+      <p:ext uri="{BB962C8B-B14F-4D97-AF65-F5344CB8AC3E}">
+        <p14:creationId xmlns:p14="http://schemas.microsoft.com/office/powerpoint/2010/main" val="299191241"/>
+      </p:ext>
+    </p:extLst>
+  </p:cSld>
+  <p:clrMapOvr>
+    <a:masterClrMapping/>
+  </p:clrMapOvr>
+</p:sld>
+</file>
+
+<file path=ppt/slides/slide115.xml><?xml version="1.0" encoding="utf-8"?>
+<p:sld xmlns:a="http://schemas.openxmlformats.org/drawingml/2006/main" xmlns:r="http://schemas.openxmlformats.org/officeDocument/2006/relationships" xmlns:p="http://schemas.openxmlformats.org/presentationml/2006/main">
+  <p:cSld>
+    <p:spTree>
+      <p:nvGrpSpPr>
+        <p:cNvPr id="1" name=""/>
+        <p:cNvGrpSpPr/>
+        <p:nvPr/>
+      </p:nvGrpSpPr>
+      <p:grpSpPr>
+        <a:xfrm>
+          <a:off x="0" y="0"/>
+          <a:ext cx="0" cy="0"/>
+          <a:chOff x="0" y="0"/>
+          <a:chExt cx="0" cy="0"/>
+        </a:xfrm>
+      </p:grpSpPr>
+      <p:sp>
+        <p:nvSpPr>
+          <p:cNvPr id="6" name="Oval 5">
+            <a:extLst>
+              <a:ext uri="{FF2B5EF4-FFF2-40B4-BE49-F238E27FC236}">
+                <a16:creationId xmlns:a16="http://schemas.microsoft.com/office/drawing/2014/main" id="{13DA4EAA-6768-65DA-BD9B-781763A785E3}"/>
+              </a:ext>
+            </a:extLst>
+          </p:cNvPr>
+          <p:cNvSpPr/>
+          <p:nvPr/>
+        </p:nvSpPr>
+        <p:spPr>
+          <a:xfrm>
+            <a:off x="2080484" y="2092233"/>
+            <a:ext cx="2679570" cy="2656072"/>
+          </a:xfrm>
+          <a:prstGeom prst="ellipse">
+            <a:avLst/>
+          </a:prstGeom>
+          <a:solidFill>
+            <a:schemeClr val="tx1"/>
+          </a:solidFill>
+          <a:ln>
+            <a:solidFill>
+              <a:schemeClr val="tx1"/>
+            </a:solidFill>
+          </a:ln>
+        </p:spPr>
+        <p:style>
+          <a:lnRef idx="2">
+            <a:schemeClr val="accent1">
+              <a:shade val="50000"/>
+            </a:schemeClr>
+          </a:lnRef>
+          <a:fillRef idx="1">
+            <a:schemeClr val="accent1"/>
+          </a:fillRef>
+          <a:effectRef idx="0">
+            <a:schemeClr val="accent1"/>
+          </a:effectRef>
+          <a:fontRef idx="minor">
+            <a:schemeClr val="lt1"/>
+          </a:fontRef>
+        </p:style>
+        <p:txBody>
+          <a:bodyPr rtlCol="0" anchor="ctr"/>
+          <a:lstStyle/>
+          <a:p>
+            <a:pPr algn="ctr"/>
+            <a:endParaRPr lang="en-NZ"/>
+          </a:p>
+        </p:txBody>
+      </p:sp>
+      <p:sp>
+        <p:nvSpPr>
+          <p:cNvPr id="10" name="TextBox 9">
+            <a:extLst>
+              <a:ext uri="{FF2B5EF4-FFF2-40B4-BE49-F238E27FC236}">
+                <a16:creationId xmlns:a16="http://schemas.microsoft.com/office/drawing/2014/main" id="{27BE155E-8F85-643E-6B6E-2F1B446FA796}"/>
+              </a:ext>
+            </a:extLst>
+          </p:cNvPr>
+          <p:cNvSpPr txBox="1"/>
+          <p:nvPr/>
+        </p:nvSpPr>
+        <p:spPr>
+          <a:xfrm>
+            <a:off x="1305168" y="140582"/>
+            <a:ext cx="4230197" cy="1938992"/>
+          </a:xfrm>
+          <a:prstGeom prst="rect">
+            <a:avLst/>
+          </a:prstGeom>
+          <a:noFill/>
+        </p:spPr>
+        <p:txBody>
+          <a:bodyPr wrap="none" rtlCol="0">
+            <a:spAutoFit/>
+          </a:bodyPr>
+          <a:lstStyle/>
+          <a:p>
+            <a:pPr algn="ctr"/>
+            <a:r>
+              <a:rPr lang="en-NZ" sz="6000" dirty="0">
+                <a:solidFill>
+                  <a:schemeClr val="bg1"/>
+                </a:solidFill>
+              </a:rPr>
+              <a:t>RIGHT</a:t>
+            </a:r>
+            <a:br>
+              <a:rPr lang="en-NZ" sz="6000" dirty="0">
+                <a:solidFill>
+                  <a:schemeClr val="bg1"/>
+                </a:solidFill>
+              </a:rPr>
+            </a:br>
+            <a:r>
+              <a:rPr lang="en-NZ" sz="6000" dirty="0">
+                <a:solidFill>
+                  <a:schemeClr val="bg1"/>
+                </a:solidFill>
+              </a:rPr>
+              <a:t>ALTERNATOR</a:t>
+            </a:r>
+          </a:p>
+        </p:txBody>
+      </p:sp>
+      <p:sp>
+        <p:nvSpPr>
+          <p:cNvPr id="12" name="TextBox 11">
+            <a:extLst>
+              <a:ext uri="{FF2B5EF4-FFF2-40B4-BE49-F238E27FC236}">
+                <a16:creationId xmlns:a16="http://schemas.microsoft.com/office/drawing/2014/main" id="{A48FA4B8-CA34-6531-B4CE-9A1F031D198D}"/>
+              </a:ext>
+            </a:extLst>
+          </p:cNvPr>
+          <p:cNvSpPr txBox="1"/>
+          <p:nvPr/>
+        </p:nvSpPr>
+        <p:spPr>
+          <a:xfrm>
+            <a:off x="2718793" y="5096870"/>
+            <a:ext cx="1402949" cy="1015663"/>
+          </a:xfrm>
+          <a:prstGeom prst="rect">
+            <a:avLst/>
+          </a:prstGeom>
+          <a:noFill/>
+        </p:spPr>
+        <p:txBody>
+          <a:bodyPr wrap="none" rtlCol="0">
+            <a:spAutoFit/>
+          </a:bodyPr>
+          <a:lstStyle/>
+          <a:p>
+            <a:pPr algn="ctr"/>
+            <a:r>
+              <a:rPr lang="en-NZ" sz="6000" dirty="0">
+                <a:solidFill>
+                  <a:schemeClr val="bg1"/>
+                </a:solidFill>
+              </a:rPr>
+              <a:t>OFF</a:t>
+            </a:r>
+          </a:p>
+        </p:txBody>
+      </p:sp>
+      <p:pic>
+        <p:nvPicPr>
+          <p:cNvPr id="5" name="Picture 4" descr="A picture containing still life photography, knob, light&#10;&#10;Description automatically generated">
+            <a:extLst>
+              <a:ext uri="{FF2B5EF4-FFF2-40B4-BE49-F238E27FC236}">
+                <a16:creationId xmlns:a16="http://schemas.microsoft.com/office/drawing/2014/main" id="{786007CA-863C-C697-2CF4-B1C06B14B355}"/>
+              </a:ext>
+            </a:extLst>
+          </p:cNvPr>
+          <p:cNvPicPr>
+            <a:picLocks noChangeAspect="1"/>
+          </p:cNvPicPr>
+          <p:nvPr/>
+        </p:nvPicPr>
+        <p:blipFill>
+          <a:blip r:embed="rId2">
+            <a:extLst>
+              <a:ext uri="{28A0092B-C50C-407E-A947-70E740481C1C}">
+                <a14:useLocalDpi xmlns:a14="http://schemas.microsoft.com/office/drawing/2010/main" val="0"/>
+              </a:ext>
+            </a:extLst>
+          </a:blip>
+          <a:stretch>
+            <a:fillRect/>
+          </a:stretch>
+        </p:blipFill>
+        <p:spPr>
+          <a:xfrm>
+            <a:off x="2080484" y="2092233"/>
+            <a:ext cx="2679570" cy="4368865"/>
+          </a:xfrm>
+          <a:prstGeom prst="rect">
+            <a:avLst/>
+          </a:prstGeom>
+        </p:spPr>
+      </p:pic>
+    </p:spTree>
+    <p:extLst>
+      <p:ext uri="{BB962C8B-B14F-4D97-AF65-F5344CB8AC3E}">
+        <p14:creationId xmlns:p14="http://schemas.microsoft.com/office/powerpoint/2010/main" val="602013519"/>
+      </p:ext>
+    </p:extLst>
+  </p:cSld>
+  <p:clrMapOvr>
+    <a:masterClrMapping/>
+  </p:clrMapOvr>
+</p:sld>
+</file>
+
+<file path=ppt/slides/slide116.xml><?xml version="1.0" encoding="utf-8"?>
+<p:sld xmlns:a="http://schemas.openxmlformats.org/drawingml/2006/main" xmlns:r="http://schemas.openxmlformats.org/officeDocument/2006/relationships" xmlns:p="http://schemas.openxmlformats.org/presentationml/2006/main">
+  <p:cSld>
+    <p:spTree>
+      <p:nvGrpSpPr>
+        <p:cNvPr id="1" name=""/>
+        <p:cNvGrpSpPr/>
+        <p:nvPr/>
+      </p:nvGrpSpPr>
+      <p:grpSpPr>
+        <a:xfrm>
+          <a:off x="0" y="0"/>
+          <a:ext cx="0" cy="0"/>
+          <a:chOff x="0" y="0"/>
+          <a:chExt cx="0" cy="0"/>
+        </a:xfrm>
+      </p:grpSpPr>
+      <p:sp>
+        <p:nvSpPr>
+          <p:cNvPr id="6" name="Oval 5">
+            <a:extLst>
+              <a:ext uri="{FF2B5EF4-FFF2-40B4-BE49-F238E27FC236}">
+                <a16:creationId xmlns:a16="http://schemas.microsoft.com/office/drawing/2014/main" id="{13DA4EAA-6768-65DA-BD9B-781763A785E3}"/>
+              </a:ext>
+            </a:extLst>
+          </p:cNvPr>
+          <p:cNvSpPr/>
+          <p:nvPr/>
+        </p:nvSpPr>
+        <p:spPr>
+          <a:xfrm>
+            <a:off x="2080484" y="2092233"/>
+            <a:ext cx="2679570" cy="2656072"/>
+          </a:xfrm>
+          <a:prstGeom prst="ellipse">
+            <a:avLst/>
+          </a:prstGeom>
+          <a:solidFill>
+            <a:schemeClr val="tx1"/>
+          </a:solidFill>
+          <a:ln>
+            <a:solidFill>
+              <a:schemeClr val="tx1"/>
+            </a:solidFill>
+          </a:ln>
+        </p:spPr>
+        <p:style>
+          <a:lnRef idx="2">
+            <a:schemeClr val="accent1">
+              <a:shade val="50000"/>
+            </a:schemeClr>
+          </a:lnRef>
+          <a:fillRef idx="1">
+            <a:schemeClr val="accent1"/>
+          </a:fillRef>
+          <a:effectRef idx="0">
+            <a:schemeClr val="accent1"/>
+          </a:effectRef>
+          <a:fontRef idx="minor">
+            <a:schemeClr val="lt1"/>
+          </a:fontRef>
+        </p:style>
+        <p:txBody>
+          <a:bodyPr rtlCol="0" anchor="ctr"/>
+          <a:lstStyle/>
+          <a:p>
+            <a:pPr algn="ctr"/>
+            <a:endParaRPr lang="en-NZ"/>
+          </a:p>
+        </p:txBody>
+      </p:sp>
+      <p:sp>
+        <p:nvSpPr>
+          <p:cNvPr id="4" name="TextBox 3">
+            <a:extLst>
+              <a:ext uri="{FF2B5EF4-FFF2-40B4-BE49-F238E27FC236}">
+                <a16:creationId xmlns:a16="http://schemas.microsoft.com/office/drawing/2014/main" id="{120E1379-0638-3F09-2917-946BABB4CDA7}"/>
+              </a:ext>
+            </a:extLst>
+          </p:cNvPr>
+          <p:cNvSpPr txBox="1"/>
+          <p:nvPr/>
+        </p:nvSpPr>
+        <p:spPr>
+          <a:xfrm>
+            <a:off x="2718793" y="5096870"/>
+            <a:ext cx="1402949" cy="1015663"/>
+          </a:xfrm>
+          <a:prstGeom prst="rect">
+            <a:avLst/>
+          </a:prstGeom>
+          <a:noFill/>
+        </p:spPr>
+        <p:txBody>
+          <a:bodyPr wrap="none" rtlCol="0">
+            <a:spAutoFit/>
+          </a:bodyPr>
+          <a:lstStyle/>
+          <a:p>
+            <a:pPr algn="ctr"/>
+            <a:r>
+              <a:rPr lang="en-NZ" sz="6000" dirty="0">
+                <a:solidFill>
+                  <a:schemeClr val="bg1"/>
+                </a:solidFill>
+              </a:rPr>
+              <a:t>OFF</a:t>
+            </a:r>
+          </a:p>
+        </p:txBody>
+      </p:sp>
+      <p:sp>
+        <p:nvSpPr>
+          <p:cNvPr id="7" name="TextBox 6">
+            <a:extLst>
+              <a:ext uri="{FF2B5EF4-FFF2-40B4-BE49-F238E27FC236}">
+                <a16:creationId xmlns:a16="http://schemas.microsoft.com/office/drawing/2014/main" id="{F00287A5-C6ED-068D-998E-A0CC691D3635}"/>
+              </a:ext>
+            </a:extLst>
+          </p:cNvPr>
+          <p:cNvSpPr txBox="1"/>
+          <p:nvPr/>
+        </p:nvSpPr>
+        <p:spPr>
+          <a:xfrm>
+            <a:off x="1305168" y="140937"/>
+            <a:ext cx="4230197" cy="1938992"/>
+          </a:xfrm>
+          <a:prstGeom prst="rect">
+            <a:avLst/>
+          </a:prstGeom>
+          <a:noFill/>
+        </p:spPr>
+        <p:txBody>
+          <a:bodyPr wrap="none" rtlCol="0">
+            <a:spAutoFit/>
+          </a:bodyPr>
+          <a:lstStyle/>
+          <a:p>
+            <a:pPr algn="ctr"/>
+            <a:r>
+              <a:rPr lang="en-NZ" sz="6000" dirty="0">
+                <a:solidFill>
+                  <a:schemeClr val="bg1"/>
+                </a:solidFill>
+              </a:rPr>
+              <a:t>RIGHT</a:t>
+            </a:r>
+            <a:br>
+              <a:rPr lang="en-NZ" sz="6000" dirty="0">
+                <a:solidFill>
+                  <a:schemeClr val="bg1"/>
+                </a:solidFill>
+              </a:rPr>
+            </a:br>
+            <a:r>
+              <a:rPr lang="en-NZ" sz="6000" dirty="0">
+                <a:solidFill>
+                  <a:schemeClr val="bg1"/>
+                </a:solidFill>
+              </a:rPr>
+              <a:t>ALTERNATOR</a:t>
+            </a:r>
+          </a:p>
+        </p:txBody>
+      </p:sp>
+      <p:pic>
+        <p:nvPicPr>
+          <p:cNvPr id="5" name="Picture 4" descr="A picture containing still life photography, knob, light&#10;&#10;Description automatically generated">
+            <a:extLst>
+              <a:ext uri="{FF2B5EF4-FFF2-40B4-BE49-F238E27FC236}">
+                <a16:creationId xmlns:a16="http://schemas.microsoft.com/office/drawing/2014/main" id="{786007CA-863C-C697-2CF4-B1C06B14B355}"/>
+              </a:ext>
+            </a:extLst>
+          </p:cNvPr>
+          <p:cNvPicPr>
+            <a:picLocks noChangeAspect="1"/>
+          </p:cNvPicPr>
+          <p:nvPr/>
+        </p:nvPicPr>
+        <p:blipFill>
+          <a:blip r:embed="rId2">
+            <a:extLst>
+              <a:ext uri="{28A0092B-C50C-407E-A947-70E740481C1C}">
+                <a14:useLocalDpi xmlns:a14="http://schemas.microsoft.com/office/drawing/2010/main" val="0"/>
+              </a:ext>
+            </a:extLst>
+          </a:blip>
+          <a:stretch>
+            <a:fillRect/>
+          </a:stretch>
+        </p:blipFill>
+        <p:spPr>
+          <a:xfrm rot="10800000">
+            <a:off x="2099734" y="417940"/>
+            <a:ext cx="2679570" cy="4368865"/>
+          </a:xfrm>
+          <a:prstGeom prst="rect">
+            <a:avLst/>
+          </a:prstGeom>
+        </p:spPr>
+      </p:pic>
+    </p:spTree>
+    <p:extLst>
+      <p:ext uri="{BB962C8B-B14F-4D97-AF65-F5344CB8AC3E}">
+        <p14:creationId xmlns:p14="http://schemas.microsoft.com/office/powerpoint/2010/main" val="4188624599"/>
+      </p:ext>
+    </p:extLst>
+  </p:cSld>
+  <p:clrMapOvr>
+    <a:masterClrMapping/>
+  </p:clrMapOvr>
+</p:sld>
+</file>
+
+<file path=ppt/slides/slide117.xml><?xml version="1.0" encoding="utf-8"?>
+<p:sld xmlns:a="http://schemas.openxmlformats.org/drawingml/2006/main" xmlns:r="http://schemas.openxmlformats.org/officeDocument/2006/relationships" xmlns:p="http://schemas.openxmlformats.org/presentationml/2006/main">
+  <p:cSld>
+    <p:spTree>
+      <p:nvGrpSpPr>
+        <p:cNvPr id="1" name=""/>
+        <p:cNvGrpSpPr/>
+        <p:nvPr/>
+      </p:nvGrpSpPr>
+      <p:grpSpPr>
+        <a:xfrm>
+          <a:off x="0" y="0"/>
+          <a:ext cx="0" cy="0"/>
+          <a:chOff x="0" y="0"/>
+          <a:chExt cx="0" cy="0"/>
+        </a:xfrm>
+      </p:grpSpPr>
+      <p:sp>
+        <p:nvSpPr>
+          <p:cNvPr id="6" name="Oval 5">
+            <a:extLst>
+              <a:ext uri="{FF2B5EF4-FFF2-40B4-BE49-F238E27FC236}">
+                <a16:creationId xmlns:a16="http://schemas.microsoft.com/office/drawing/2014/main" id="{13DA4EAA-6768-65DA-BD9B-781763A785E3}"/>
+              </a:ext>
+            </a:extLst>
+          </p:cNvPr>
+          <p:cNvSpPr/>
+          <p:nvPr/>
+        </p:nvSpPr>
+        <p:spPr>
+          <a:xfrm>
+            <a:off x="2080484" y="2092233"/>
+            <a:ext cx="2679570" cy="2656072"/>
+          </a:xfrm>
+          <a:prstGeom prst="ellipse">
+            <a:avLst/>
+          </a:prstGeom>
+          <a:solidFill>
+            <a:schemeClr val="tx1"/>
+          </a:solidFill>
+          <a:ln>
+            <a:solidFill>
+              <a:schemeClr val="tx1"/>
+            </a:solidFill>
+          </a:ln>
+        </p:spPr>
+        <p:style>
+          <a:lnRef idx="2">
+            <a:schemeClr val="accent1">
+              <a:shade val="50000"/>
+            </a:schemeClr>
+          </a:lnRef>
+          <a:fillRef idx="1">
+            <a:schemeClr val="accent1"/>
+          </a:fillRef>
+          <a:effectRef idx="0">
+            <a:schemeClr val="accent1"/>
+          </a:effectRef>
+          <a:fontRef idx="minor">
+            <a:schemeClr val="lt1"/>
+          </a:fontRef>
+        </p:style>
+        <p:txBody>
+          <a:bodyPr rtlCol="0" anchor="ctr"/>
+          <a:lstStyle/>
+          <a:p>
+            <a:pPr algn="ctr"/>
+            <a:endParaRPr lang="en-NZ"/>
+          </a:p>
+        </p:txBody>
+      </p:sp>
+      <p:sp>
+        <p:nvSpPr>
+          <p:cNvPr id="10" name="TextBox 9">
+            <a:extLst>
+              <a:ext uri="{FF2B5EF4-FFF2-40B4-BE49-F238E27FC236}">
+                <a16:creationId xmlns:a16="http://schemas.microsoft.com/office/drawing/2014/main" id="{27BE155E-8F85-643E-6B6E-2F1B446FA796}"/>
+              </a:ext>
+            </a:extLst>
+          </p:cNvPr>
+          <p:cNvSpPr txBox="1"/>
+          <p:nvPr/>
+        </p:nvSpPr>
+        <p:spPr>
+          <a:xfrm>
+            <a:off x="1305168" y="140582"/>
+            <a:ext cx="4230197" cy="1938992"/>
+          </a:xfrm>
+          <a:prstGeom prst="rect">
+            <a:avLst/>
+          </a:prstGeom>
+          <a:noFill/>
+        </p:spPr>
+        <p:txBody>
+          <a:bodyPr wrap="none" rtlCol="0">
+            <a:spAutoFit/>
+          </a:bodyPr>
+          <a:lstStyle/>
+          <a:p>
+            <a:pPr algn="ctr"/>
+            <a:r>
+              <a:rPr lang="en-NZ" sz="6000" dirty="0">
+                <a:solidFill>
+                  <a:schemeClr val="bg1"/>
+                </a:solidFill>
+              </a:rPr>
+              <a:t>MASTER</a:t>
+            </a:r>
+            <a:br>
+              <a:rPr lang="en-NZ" sz="6000" dirty="0">
+                <a:solidFill>
+                  <a:schemeClr val="bg1"/>
+                </a:solidFill>
+              </a:rPr>
+            </a:br>
+            <a:r>
+              <a:rPr lang="en-NZ" sz="6000" dirty="0">
+                <a:solidFill>
+                  <a:schemeClr val="bg1"/>
+                </a:solidFill>
+              </a:rPr>
+              <a:t>ALTERNATOR</a:t>
+            </a:r>
+          </a:p>
+        </p:txBody>
+      </p:sp>
+      <p:sp>
+        <p:nvSpPr>
+          <p:cNvPr id="12" name="TextBox 11">
+            <a:extLst>
+              <a:ext uri="{FF2B5EF4-FFF2-40B4-BE49-F238E27FC236}">
+                <a16:creationId xmlns:a16="http://schemas.microsoft.com/office/drawing/2014/main" id="{A48FA4B8-CA34-6531-B4CE-9A1F031D198D}"/>
+              </a:ext>
+            </a:extLst>
+          </p:cNvPr>
+          <p:cNvSpPr txBox="1"/>
+          <p:nvPr/>
+        </p:nvSpPr>
+        <p:spPr>
+          <a:xfrm>
+            <a:off x="2718793" y="5096870"/>
+            <a:ext cx="1402949" cy="1015663"/>
+          </a:xfrm>
+          <a:prstGeom prst="rect">
+            <a:avLst/>
+          </a:prstGeom>
+          <a:noFill/>
+        </p:spPr>
+        <p:txBody>
+          <a:bodyPr wrap="none" rtlCol="0">
+            <a:spAutoFit/>
+          </a:bodyPr>
+          <a:lstStyle/>
+          <a:p>
+            <a:pPr algn="ctr"/>
+            <a:r>
+              <a:rPr lang="en-NZ" sz="6000" dirty="0">
+                <a:solidFill>
+                  <a:schemeClr val="bg1"/>
+                </a:solidFill>
+              </a:rPr>
+              <a:t>OFF</a:t>
+            </a:r>
+          </a:p>
+        </p:txBody>
+      </p:sp>
+      <p:pic>
+        <p:nvPicPr>
+          <p:cNvPr id="5" name="Picture 4" descr="A picture containing still life photography, knob, light&#10;&#10;Description automatically generated">
+            <a:extLst>
+              <a:ext uri="{FF2B5EF4-FFF2-40B4-BE49-F238E27FC236}">
+                <a16:creationId xmlns:a16="http://schemas.microsoft.com/office/drawing/2014/main" id="{786007CA-863C-C697-2CF4-B1C06B14B355}"/>
+              </a:ext>
+            </a:extLst>
+          </p:cNvPr>
+          <p:cNvPicPr>
+            <a:picLocks noChangeAspect="1"/>
+          </p:cNvPicPr>
+          <p:nvPr/>
+        </p:nvPicPr>
+        <p:blipFill>
+          <a:blip r:embed="rId2">
+            <a:extLst>
+              <a:ext uri="{28A0092B-C50C-407E-A947-70E740481C1C}">
+                <a14:useLocalDpi xmlns:a14="http://schemas.microsoft.com/office/drawing/2010/main" val="0"/>
+              </a:ext>
+            </a:extLst>
+          </a:blip>
+          <a:stretch>
+            <a:fillRect/>
+          </a:stretch>
+        </p:blipFill>
+        <p:spPr>
+          <a:xfrm>
+            <a:off x="2080484" y="2092233"/>
+            <a:ext cx="2679570" cy="4368865"/>
+          </a:xfrm>
+          <a:prstGeom prst="rect">
+            <a:avLst/>
+          </a:prstGeom>
+        </p:spPr>
+      </p:pic>
+    </p:spTree>
+    <p:extLst>
+      <p:ext uri="{BB962C8B-B14F-4D97-AF65-F5344CB8AC3E}">
+        <p14:creationId xmlns:p14="http://schemas.microsoft.com/office/powerpoint/2010/main" val="3113215075"/>
+      </p:ext>
+    </p:extLst>
+  </p:cSld>
+  <p:clrMapOvr>
+    <a:masterClrMapping/>
+  </p:clrMapOvr>
+</p:sld>
+</file>
+
+<file path=ppt/slides/slide118.xml><?xml version="1.0" encoding="utf-8"?>
+<p:sld xmlns:a="http://schemas.openxmlformats.org/drawingml/2006/main" xmlns:r="http://schemas.openxmlformats.org/officeDocument/2006/relationships" xmlns:p="http://schemas.openxmlformats.org/presentationml/2006/main">
+  <p:cSld>
+    <p:spTree>
+      <p:nvGrpSpPr>
+        <p:cNvPr id="1" name=""/>
+        <p:cNvGrpSpPr/>
+        <p:nvPr/>
+      </p:nvGrpSpPr>
+      <p:grpSpPr>
+        <a:xfrm>
+          <a:off x="0" y="0"/>
+          <a:ext cx="0" cy="0"/>
+          <a:chOff x="0" y="0"/>
+          <a:chExt cx="0" cy="0"/>
+        </a:xfrm>
+      </p:grpSpPr>
+      <p:sp>
+        <p:nvSpPr>
+          <p:cNvPr id="6" name="Oval 5">
+            <a:extLst>
+              <a:ext uri="{FF2B5EF4-FFF2-40B4-BE49-F238E27FC236}">
+                <a16:creationId xmlns:a16="http://schemas.microsoft.com/office/drawing/2014/main" id="{13DA4EAA-6768-65DA-BD9B-781763A785E3}"/>
+              </a:ext>
+            </a:extLst>
+          </p:cNvPr>
+          <p:cNvSpPr/>
+          <p:nvPr/>
+        </p:nvSpPr>
+        <p:spPr>
+          <a:xfrm>
+            <a:off x="2080484" y="2092233"/>
+            <a:ext cx="2679570" cy="2656072"/>
+          </a:xfrm>
+          <a:prstGeom prst="ellipse">
+            <a:avLst/>
+          </a:prstGeom>
+          <a:solidFill>
+            <a:schemeClr val="tx1"/>
+          </a:solidFill>
+          <a:ln>
+            <a:solidFill>
+              <a:schemeClr val="tx1"/>
+            </a:solidFill>
+          </a:ln>
+        </p:spPr>
+        <p:style>
+          <a:lnRef idx="2">
+            <a:schemeClr val="accent1">
+              <a:shade val="50000"/>
+            </a:schemeClr>
+          </a:lnRef>
+          <a:fillRef idx="1">
+            <a:schemeClr val="accent1"/>
+          </a:fillRef>
+          <a:effectRef idx="0">
+            <a:schemeClr val="accent1"/>
+          </a:effectRef>
+          <a:fontRef idx="minor">
+            <a:schemeClr val="lt1"/>
+          </a:fontRef>
+        </p:style>
+        <p:txBody>
+          <a:bodyPr rtlCol="0" anchor="ctr"/>
+          <a:lstStyle/>
+          <a:p>
+            <a:pPr algn="ctr"/>
+            <a:endParaRPr lang="en-NZ"/>
+          </a:p>
+        </p:txBody>
+      </p:sp>
+      <p:sp>
+        <p:nvSpPr>
+          <p:cNvPr id="4" name="TextBox 3">
+            <a:extLst>
+              <a:ext uri="{FF2B5EF4-FFF2-40B4-BE49-F238E27FC236}">
+                <a16:creationId xmlns:a16="http://schemas.microsoft.com/office/drawing/2014/main" id="{120E1379-0638-3F09-2917-946BABB4CDA7}"/>
+              </a:ext>
+            </a:extLst>
+          </p:cNvPr>
+          <p:cNvSpPr txBox="1"/>
+          <p:nvPr/>
+        </p:nvSpPr>
+        <p:spPr>
+          <a:xfrm>
+            <a:off x="2718793" y="5096870"/>
+            <a:ext cx="1402949" cy="1015663"/>
+          </a:xfrm>
+          <a:prstGeom prst="rect">
+            <a:avLst/>
+          </a:prstGeom>
+          <a:noFill/>
+        </p:spPr>
+        <p:txBody>
+          <a:bodyPr wrap="none" rtlCol="0">
+            <a:spAutoFit/>
+          </a:bodyPr>
+          <a:lstStyle/>
+          <a:p>
+            <a:pPr algn="ctr"/>
+            <a:r>
+              <a:rPr lang="en-NZ" sz="6000" dirty="0">
+                <a:solidFill>
+                  <a:schemeClr val="bg1"/>
+                </a:solidFill>
+              </a:rPr>
+              <a:t>OFF</a:t>
+            </a:r>
+          </a:p>
+        </p:txBody>
+      </p:sp>
+      <p:sp>
+        <p:nvSpPr>
+          <p:cNvPr id="7" name="TextBox 6">
+            <a:extLst>
+              <a:ext uri="{FF2B5EF4-FFF2-40B4-BE49-F238E27FC236}">
+                <a16:creationId xmlns:a16="http://schemas.microsoft.com/office/drawing/2014/main" id="{F00287A5-C6ED-068D-998E-A0CC691D3635}"/>
+              </a:ext>
+            </a:extLst>
+          </p:cNvPr>
+          <p:cNvSpPr txBox="1"/>
+          <p:nvPr/>
+        </p:nvSpPr>
+        <p:spPr>
+          <a:xfrm>
+            <a:off x="1305168" y="140937"/>
+            <a:ext cx="4230197" cy="1938992"/>
+          </a:xfrm>
+          <a:prstGeom prst="rect">
+            <a:avLst/>
+          </a:prstGeom>
+          <a:noFill/>
+        </p:spPr>
+        <p:txBody>
+          <a:bodyPr wrap="none" rtlCol="0">
+            <a:spAutoFit/>
+          </a:bodyPr>
+          <a:lstStyle/>
+          <a:p>
+            <a:pPr algn="ctr"/>
+            <a:r>
+              <a:rPr lang="en-NZ" sz="6000" dirty="0">
+                <a:solidFill>
+                  <a:schemeClr val="bg1"/>
+                </a:solidFill>
+              </a:rPr>
+              <a:t>MASTER</a:t>
+            </a:r>
+            <a:br>
+              <a:rPr lang="en-NZ" sz="6000" dirty="0">
+                <a:solidFill>
+                  <a:schemeClr val="bg1"/>
+                </a:solidFill>
+              </a:rPr>
+            </a:br>
+            <a:r>
+              <a:rPr lang="en-NZ" sz="6000" dirty="0">
+                <a:solidFill>
+                  <a:schemeClr val="bg1"/>
+                </a:solidFill>
+              </a:rPr>
+              <a:t>ALTERNATOR</a:t>
+            </a:r>
+          </a:p>
+        </p:txBody>
+      </p:sp>
+      <p:pic>
+        <p:nvPicPr>
+          <p:cNvPr id="5" name="Picture 4" descr="A picture containing still life photography, knob, light&#10;&#10;Description automatically generated">
+            <a:extLst>
+              <a:ext uri="{FF2B5EF4-FFF2-40B4-BE49-F238E27FC236}">
+                <a16:creationId xmlns:a16="http://schemas.microsoft.com/office/drawing/2014/main" id="{786007CA-863C-C697-2CF4-B1C06B14B355}"/>
+              </a:ext>
+            </a:extLst>
+          </p:cNvPr>
+          <p:cNvPicPr>
+            <a:picLocks noChangeAspect="1"/>
+          </p:cNvPicPr>
+          <p:nvPr/>
+        </p:nvPicPr>
+        <p:blipFill>
+          <a:blip r:embed="rId2">
+            <a:extLst>
+              <a:ext uri="{28A0092B-C50C-407E-A947-70E740481C1C}">
+                <a14:useLocalDpi xmlns:a14="http://schemas.microsoft.com/office/drawing/2010/main" val="0"/>
+              </a:ext>
+            </a:extLst>
+          </a:blip>
+          <a:stretch>
+            <a:fillRect/>
+          </a:stretch>
+        </p:blipFill>
+        <p:spPr>
+          <a:xfrm rot="10800000">
+            <a:off x="2099734" y="417940"/>
+            <a:ext cx="2679570" cy="4368865"/>
+          </a:xfrm>
+          <a:prstGeom prst="rect">
+            <a:avLst/>
+          </a:prstGeom>
+        </p:spPr>
+      </p:pic>
+    </p:spTree>
+    <p:extLst>
+      <p:ext uri="{BB962C8B-B14F-4D97-AF65-F5344CB8AC3E}">
+        <p14:creationId xmlns:p14="http://schemas.microsoft.com/office/powerpoint/2010/main" val="1794464158"/>
       </p:ext>
     </p:extLst>
   </p:cSld>

</xml_diff>